<commit_message>
Ausformulierung der Notizen bei der Präsentation
</commit_message>
<xml_diff>
--- a/documents/Präsentation.pptx
+++ b/documents/Präsentation.pptx
@@ -130,6 +130,10 @@
 </p:presentation>
 </file>
 
+<file path=ppt/revisionInfo.xml><?xml version="1.0" encoding="utf-8"?>
+<p1510:revInfo xmlns:a="http://schemas.openxmlformats.org/drawingml/2006/main" xmlns:r="http://schemas.openxmlformats.org/officeDocument/2006/relationships" xmlns:p1510="http://schemas.microsoft.com/office/powerpoint/2015/10/main"/>
+</file>
+
 <file path=ppt/notesMasters/notesMaster1.xml><?xml version="1.0" encoding="utf-8"?>
 <p:notesMaster xmlns:a="http://schemas.openxmlformats.org/drawingml/2006/main" xmlns:r="http://schemas.openxmlformats.org/officeDocument/2006/relationships" xmlns:p="http://schemas.openxmlformats.org/presentationml/2006/main">
   <p:cSld>
@@ -212,7 +216,7 @@
           <a:p>
             <a:fld id="{F59F45D9-85FE-8F45-A7E4-176787CD4F9C}" type="datetimeFigureOut">
               <a:rPr lang="de-DE" smtClean="0"/>
-              <a:t>14.05.17</a:t>
+              <a:t>14.05.2017</a:t>
             </a:fld>
             <a:endParaRPr lang="de-DE"/>
           </a:p>
@@ -276,38 +280,37 @@
           <a:p>
             <a:pPr lvl="0"/>
             <a:r>
-              <a:rPr lang="de-DE" smtClean="0"/>
+              <a:rPr lang="de-DE"/>
               <a:t>Mastertextformat bearbeiten</a:t>
             </a:r>
           </a:p>
           <a:p>
             <a:pPr lvl="1"/>
             <a:r>
-              <a:rPr lang="de-DE" smtClean="0"/>
+              <a:rPr lang="de-DE"/>
               <a:t>Zweite Ebene</a:t>
             </a:r>
           </a:p>
           <a:p>
             <a:pPr lvl="2"/>
             <a:r>
-              <a:rPr lang="de-DE" smtClean="0"/>
+              <a:rPr lang="de-DE"/>
               <a:t>Dritte Ebene</a:t>
             </a:r>
           </a:p>
           <a:p>
             <a:pPr lvl="3"/>
             <a:r>
-              <a:rPr lang="de-DE" smtClean="0"/>
+              <a:rPr lang="de-DE"/>
               <a:t>Vierte Ebene</a:t>
             </a:r>
           </a:p>
           <a:p>
             <a:pPr lvl="4"/>
             <a:r>
-              <a:rPr lang="de-DE" smtClean="0"/>
+              <a:rPr lang="de-DE"/>
               <a:t>Fünfte Ebene</a:t>
             </a:r>
-            <a:endParaRPr lang="de-DE"/>
           </a:p>
         </p:txBody>
       </p:sp>
@@ -528,7 +531,7 @@
               <a:buAutoNum type="arabicParenBoth"/>
             </a:pPr>
             <a:r>
-              <a:rPr lang="de-DE" sz="1200" b="1" kern="1200" dirty="0" smtClean="0">
+              <a:rPr lang="de-DE" sz="1200" b="1" kern="1200" dirty="0">
                 <a:solidFill>
                   <a:schemeClr val="tx1"/>
                 </a:solidFill>
@@ -540,7 +543,7 @@
               <a:t>Anmelden</a:t>
             </a:r>
             <a:r>
-              <a:rPr lang="de-DE" sz="1200" b="1" kern="1200" baseline="0" dirty="0" smtClean="0">
+              <a:rPr lang="de-DE" sz="1200" b="1" kern="1200" baseline="0" dirty="0">
                 <a:solidFill>
                   <a:schemeClr val="tx1"/>
                 </a:solidFill>
@@ -549,10 +552,10 @@
                 <a:ea typeface="+mn-ea"/>
                 <a:cs typeface="+mn-cs"/>
               </a:rPr>
-              <a:t> beim Login beispielsweise mit Benutzername und </a:t>
-            </a:r>
-            <a:r>
-              <a:rPr lang="de-DE" sz="1200" b="1" kern="1200" baseline="0" dirty="0" err="1" smtClean="0">
+              <a:t> beim Login beispielsweise mit Benutzername und Passwort</a:t>
+            </a:r>
+            <a:br>
+              <a:rPr lang="de-DE" sz="1200" b="1" kern="1200" baseline="0" dirty="0">
                 <a:solidFill>
                   <a:schemeClr val="tx1"/>
                 </a:solidFill>
@@ -561,9 +564,67 @@
                 <a:ea typeface="+mn-ea"/>
                 <a:cs typeface="+mn-cs"/>
               </a:rPr>
-              <a:t>passwort</a:t>
-            </a:r>
-            <a:endParaRPr lang="de-DE" sz="1200" b="1" kern="1200" baseline="0" dirty="0" smtClean="0">
+            </a:br>
+            <a:r>
+              <a:rPr lang="de-DE" sz="1200" b="0" kern="1200" baseline="0" dirty="0">
+                <a:solidFill>
+                  <a:schemeClr val="tx1"/>
+                </a:solidFill>
+                <a:effectLst/>
+                <a:latin typeface="+mn-lt"/>
+                <a:ea typeface="+mn-ea"/>
+                <a:cs typeface="+mn-cs"/>
+              </a:rPr>
+              <a:t>Der Authentifizierungsserver erstellt einen Token, welchen er an den Client übergibt</a:t>
+            </a:r>
+            <a:br>
+              <a:rPr lang="de-DE" sz="1200" b="0" kern="1200" baseline="0" dirty="0">
+                <a:solidFill>
+                  <a:schemeClr val="tx1"/>
+                </a:solidFill>
+                <a:effectLst/>
+                <a:latin typeface="+mn-lt"/>
+                <a:ea typeface="+mn-ea"/>
+                <a:cs typeface="+mn-cs"/>
+              </a:rPr>
+            </a:br>
+            <a:r>
+              <a:rPr lang="de-DE" sz="1200" b="0" kern="1200" baseline="0" dirty="0">
+                <a:solidFill>
+                  <a:schemeClr val="tx1"/>
+                </a:solidFill>
+                <a:effectLst/>
+                <a:latin typeface="+mn-lt"/>
+                <a:ea typeface="+mn-ea"/>
+                <a:cs typeface="+mn-cs"/>
+              </a:rPr>
+              <a:t>Client frägt hierzu mit seinen Daten an der externen Schnittstelle des </a:t>
+            </a:r>
+            <a:r>
+              <a:rPr lang="de-DE" sz="1200" b="0" kern="1200" baseline="0" dirty="0" err="1">
+                <a:solidFill>
+                  <a:schemeClr val="tx1"/>
+                </a:solidFill>
+                <a:effectLst/>
+                <a:latin typeface="+mn-lt"/>
+                <a:ea typeface="+mn-ea"/>
+                <a:cs typeface="+mn-cs"/>
+              </a:rPr>
+              <a:t>AuthServers</a:t>
+            </a:r>
+            <a:r>
+              <a:rPr lang="de-DE" sz="1200" b="0" kern="1200" baseline="0" dirty="0">
+                <a:solidFill>
+                  <a:schemeClr val="tx1"/>
+                </a:solidFill>
+                <a:effectLst/>
+                <a:latin typeface="+mn-lt"/>
+                <a:ea typeface="+mn-ea"/>
+                <a:cs typeface="+mn-cs"/>
+              </a:rPr>
+              <a:t> an</a:t>
+            </a:r>
+            <a:endParaRPr lang="de-DE" sz="1200" b="1" kern="1200" baseline="0" dirty="0">
               <a:solidFill>
                 <a:schemeClr val="tx1"/>
               </a:solidFill>
@@ -578,7 +639,7 @@
               <a:buAutoNum type="arabicParenBoth"/>
             </a:pPr>
             <a:r>
-              <a:rPr lang="de-DE" sz="1200" b="1" kern="1200" baseline="0" dirty="0" smtClean="0">
+              <a:rPr lang="de-DE" sz="1200" b="1" kern="1200" baseline="0" dirty="0">
                 <a:solidFill>
                   <a:schemeClr val="tx1"/>
                 </a:solidFill>
@@ -587,10 +648,10 @@
                 <a:ea typeface="+mn-ea"/>
                 <a:cs typeface="+mn-cs"/>
               </a:rPr>
-              <a:t>Client stellt anfrage an </a:t>
-            </a:r>
-            <a:r>
-              <a:rPr lang="de-DE" sz="1200" b="1" kern="1200" baseline="0" dirty="0" err="1" smtClean="0">
+              <a:t>Client stellt Anfrage an </a:t>
+            </a:r>
+            <a:r>
+              <a:rPr lang="de-DE" sz="1200" b="1" kern="1200" baseline="0" dirty="0" err="1">
                 <a:solidFill>
                   <a:schemeClr val="tx1"/>
                 </a:solidFill>
@@ -601,8 +662,8 @@
               </a:rPr>
               <a:t>Microservice</a:t>
             </a:r>
-            <a:r>
-              <a:rPr lang="de-DE" sz="1200" b="1" kern="1200" baseline="0" dirty="0" smtClean="0">
+            <a:br>
+              <a:rPr lang="de-DE" sz="1200" b="1" kern="1200" baseline="0" dirty="0">
                 <a:solidFill>
                   <a:schemeClr val="tx1"/>
                 </a:solidFill>
@@ -611,10 +672,9 @@
                 <a:ea typeface="+mn-ea"/>
                 <a:cs typeface="+mn-cs"/>
               </a:rPr>
-              <a:t> mit </a:t>
-            </a:r>
-            <a:r>
-              <a:rPr lang="de-DE" sz="1200" b="1" kern="1200" baseline="0" dirty="0" err="1" smtClean="0">
+            </a:br>
+            <a:r>
+              <a:rPr lang="de-DE" sz="1200" b="0" kern="1200" baseline="0" dirty="0">
                 <a:solidFill>
                   <a:schemeClr val="tx1"/>
                 </a:solidFill>
@@ -623,9 +683,9 @@
                 <a:ea typeface="+mn-ea"/>
                 <a:cs typeface="+mn-cs"/>
               </a:rPr>
-              <a:t>TokenID</a:t>
-            </a:r>
-            <a:endParaRPr lang="de-DE" sz="1200" b="1" kern="1200" baseline="0" dirty="0" smtClean="0">
+              <a:t>In der Anfrage übergibt der Client auch sein zuvor erhaltenes Token</a:t>
+            </a:r>
+            <a:endParaRPr lang="de-DE" sz="1200" b="1" kern="1200" baseline="0" dirty="0">
               <a:solidFill>
                 <a:schemeClr val="tx1"/>
               </a:solidFill>
@@ -640,7 +700,7 @@
               <a:buAutoNum type="arabicParenBoth"/>
             </a:pPr>
             <a:r>
-              <a:rPr lang="de-DE" sz="1200" b="1" kern="1200" baseline="0" dirty="0" err="1" smtClean="0">
+              <a:rPr lang="de-DE" sz="1200" b="1" kern="1200" baseline="0" dirty="0" err="1">
                 <a:solidFill>
                   <a:schemeClr val="tx1"/>
                 </a:solidFill>
@@ -652,7 +712,7 @@
               <a:t>Microservice</a:t>
             </a:r>
             <a:r>
-              <a:rPr lang="de-DE" sz="1200" b="1" kern="1200" baseline="0" dirty="0" smtClean="0">
+              <a:rPr lang="de-DE" sz="1200" b="1" kern="1200" baseline="0" dirty="0">
                 <a:solidFill>
                   <a:schemeClr val="tx1"/>
                 </a:solidFill>
@@ -661,10 +721,10 @@
                 <a:ea typeface="+mn-ea"/>
                 <a:cs typeface="+mn-cs"/>
               </a:rPr>
-              <a:t> fragt </a:t>
-            </a:r>
-            <a:r>
-              <a:rPr lang="de-DE" sz="1200" b="1" kern="1200" baseline="0" dirty="0" err="1" smtClean="0">
+              <a:t> validiert Client-Token und Berechtigung am </a:t>
+            </a:r>
+            <a:r>
+              <a:rPr lang="de-DE" sz="1200" b="1" kern="1200" baseline="0" dirty="0" err="1">
                 <a:solidFill>
                   <a:schemeClr val="tx1"/>
                 </a:solidFill>
@@ -675,8 +735,8 @@
               </a:rPr>
               <a:t>AuthServer</a:t>
             </a:r>
-            <a:r>
-              <a:rPr lang="de-DE" sz="1200" b="1" kern="1200" baseline="0" dirty="0" smtClean="0">
+            <a:br>
+              <a:rPr lang="de-DE" sz="1200" b="1" kern="1200" baseline="0" dirty="0">
                 <a:solidFill>
                   <a:schemeClr val="tx1"/>
                 </a:solidFill>
@@ -685,10 +745,9 @@
                 <a:ea typeface="+mn-ea"/>
                 <a:cs typeface="+mn-cs"/>
               </a:rPr>
-              <a:t> mit </a:t>
-            </a:r>
-            <a:r>
-              <a:rPr lang="de-DE" sz="1200" b="1" kern="1200" baseline="0" dirty="0" err="1" smtClean="0">
+            </a:br>
+            <a:r>
+              <a:rPr lang="de-DE" sz="1200" b="0" kern="1200" baseline="0" dirty="0">
                 <a:solidFill>
                   <a:schemeClr val="tx1"/>
                 </a:solidFill>
@@ -697,10 +756,10 @@
                 <a:ea typeface="+mn-ea"/>
                 <a:cs typeface="+mn-cs"/>
               </a:rPr>
-              <a:t>TokenID</a:t>
-            </a:r>
-            <a:r>
-              <a:rPr lang="de-DE" sz="1200" b="1" kern="1200" baseline="0" dirty="0" smtClean="0">
+              <a:t>Bevor der </a:t>
+            </a:r>
+            <a:r>
+              <a:rPr lang="de-DE" sz="1200" b="0" kern="1200" baseline="0" dirty="0" err="1">
                 <a:solidFill>
                   <a:schemeClr val="tx1"/>
                 </a:solidFill>
@@ -709,15 +768,10 @@
                 <a:ea typeface="+mn-ea"/>
                 <a:cs typeface="+mn-cs"/>
               </a:rPr>
-              <a:t> und benötigten Rechten nach ob valide.</a:t>
-            </a:r>
-          </a:p>
-          <a:p>
-            <a:pPr marL="228600" indent="-228600">
-              <a:buAutoNum type="arabicParenBoth"/>
-            </a:pPr>
-            <a:r>
-              <a:rPr lang="de-DE" sz="1200" b="1" kern="1200" baseline="0" dirty="0" smtClean="0">
+              <a:t>angefrage</a:t>
+            </a:r>
+            <a:r>
+              <a:rPr lang="de-DE" sz="1200" b="0" kern="1200" baseline="0" dirty="0">
                 <a:solidFill>
                   <a:schemeClr val="tx1"/>
                 </a:solidFill>
@@ -726,10 +780,104 @@
                 <a:ea typeface="+mn-ea"/>
                 <a:cs typeface="+mn-cs"/>
               </a:rPr>
-              <a:t>Antwort des </a:t>
-            </a:r>
-            <a:r>
-              <a:rPr lang="de-DE" sz="1200" b="1" kern="1200" baseline="0" dirty="0" err="1" smtClean="0">
+              <a:t> Service seine Dienste leistet, überprüft er am </a:t>
+            </a:r>
+            <a:r>
+              <a:rPr lang="de-DE" sz="1200" b="0" kern="1200" baseline="0" dirty="0" err="1">
+                <a:solidFill>
+                  <a:schemeClr val="tx1"/>
+                </a:solidFill>
+                <a:effectLst/>
+                <a:latin typeface="+mn-lt"/>
+                <a:ea typeface="+mn-ea"/>
+                <a:cs typeface="+mn-cs"/>
+              </a:rPr>
+              <a:t>AuthServer</a:t>
+            </a:r>
+            <a:r>
+              <a:rPr lang="de-DE" sz="1200" b="0" kern="1200" baseline="0" dirty="0">
+                <a:solidFill>
+                  <a:schemeClr val="tx1"/>
+                </a:solidFill>
+                <a:effectLst/>
+                <a:latin typeface="+mn-lt"/>
+                <a:ea typeface="+mn-ea"/>
+                <a:cs typeface="+mn-cs"/>
+              </a:rPr>
+              <a:t>:</a:t>
+            </a:r>
+            <a:br>
+              <a:rPr lang="de-DE" sz="1200" b="0" kern="1200" baseline="0" dirty="0">
+                <a:solidFill>
+                  <a:schemeClr val="tx1"/>
+                </a:solidFill>
+                <a:effectLst/>
+                <a:latin typeface="+mn-lt"/>
+                <a:ea typeface="+mn-ea"/>
+                <a:cs typeface="+mn-cs"/>
+              </a:rPr>
+            </a:br>
+            <a:r>
+              <a:rPr lang="de-DE" sz="1200" b="0" kern="1200" baseline="0" dirty="0">
+                <a:solidFill>
+                  <a:schemeClr val="tx1"/>
+                </a:solidFill>
+                <a:effectLst/>
+                <a:latin typeface="+mn-lt"/>
+                <a:ea typeface="+mn-ea"/>
+                <a:cs typeface="+mn-cs"/>
+              </a:rPr>
+              <a:t>- ist das Token valide ? (gehört es zum anfragenden User </a:t>
+            </a:r>
+            <a:r>
+              <a:rPr lang="de-DE" sz="1200" b="0" kern="1200" baseline="0" dirty="0" err="1">
+                <a:solidFill>
+                  <a:schemeClr val="tx1"/>
+                </a:solidFill>
+                <a:effectLst/>
+                <a:latin typeface="+mn-lt"/>
+                <a:ea typeface="+mn-ea"/>
+                <a:cs typeface="+mn-cs"/>
+              </a:rPr>
+              <a:t>etc</a:t>
+            </a:r>
+            <a:r>
+              <a:rPr lang="de-DE" sz="1200" b="0" kern="1200" baseline="0" dirty="0">
+                <a:solidFill>
+                  <a:schemeClr val="tx1"/>
+                </a:solidFill>
+                <a:effectLst/>
+                <a:latin typeface="+mn-lt"/>
+                <a:ea typeface="+mn-ea"/>
+                <a:cs typeface="+mn-cs"/>
+              </a:rPr>
+              <a:t>)</a:t>
+            </a:r>
+            <a:br>
+              <a:rPr lang="de-DE" sz="1200" b="0" kern="1200" baseline="0" dirty="0">
+                <a:solidFill>
+                  <a:schemeClr val="tx1"/>
+                </a:solidFill>
+                <a:effectLst/>
+                <a:latin typeface="+mn-lt"/>
+                <a:ea typeface="+mn-ea"/>
+                <a:cs typeface="+mn-cs"/>
+              </a:rPr>
+            </a:br>
+            <a:r>
+              <a:rPr lang="de-DE" sz="1200" b="0" kern="1200" baseline="0" dirty="0">
+                <a:solidFill>
+                  <a:schemeClr val="tx1"/>
+                </a:solidFill>
+                <a:effectLst/>
+                <a:latin typeface="+mn-lt"/>
+                <a:ea typeface="+mn-ea"/>
+                <a:cs typeface="+mn-cs"/>
+              </a:rPr>
+              <a:t>- besitzt der User die benötigten Rechte? (Diese muss der </a:t>
+            </a:r>
+            <a:r>
+              <a:rPr lang="de-DE" sz="1200" b="0" kern="1200" baseline="0" dirty="0" err="1">
                 <a:solidFill>
                   <a:schemeClr val="tx1"/>
                 </a:solidFill>
@@ -740,7 +888,90 @@
               </a:rPr>
               <a:t>Microservice</a:t>
             </a:r>
-            <a:endParaRPr lang="de-DE" sz="1200" b="1" kern="1200" dirty="0" smtClean="0">
+            <a:r>
+              <a:rPr lang="de-DE" sz="1200" b="0" kern="1200" baseline="0" dirty="0">
+                <a:solidFill>
+                  <a:schemeClr val="tx1"/>
+                </a:solidFill>
+                <a:effectLst/>
+                <a:latin typeface="+mn-lt"/>
+                <a:ea typeface="+mn-ea"/>
+                <a:cs typeface="+mn-cs"/>
+              </a:rPr>
+              <a:t> mit übergeben)</a:t>
+            </a:r>
+            <a:br>
+              <a:rPr lang="de-DE" sz="1200" b="0" kern="1200" baseline="0" dirty="0">
+                <a:solidFill>
+                  <a:schemeClr val="tx1"/>
+                </a:solidFill>
+                <a:effectLst/>
+                <a:latin typeface="+mn-lt"/>
+                <a:ea typeface="+mn-ea"/>
+                <a:cs typeface="+mn-cs"/>
+              </a:rPr>
+            </a:br>
+            <a:r>
+              <a:rPr lang="de-DE" sz="1200" b="0" kern="1200" baseline="0" dirty="0">
+                <a:solidFill>
+                  <a:schemeClr val="tx1"/>
+                </a:solidFill>
+                <a:effectLst/>
+                <a:latin typeface="+mn-lt"/>
+                <a:ea typeface="+mn-ea"/>
+                <a:cs typeface="+mn-cs"/>
+              </a:rPr>
+              <a:t>Dafür schickt er die </a:t>
+            </a:r>
+            <a:r>
+              <a:rPr lang="de-DE" sz="1200" b="0" kern="1200" baseline="0" dirty="0" err="1">
+                <a:solidFill>
+                  <a:schemeClr val="tx1"/>
+                </a:solidFill>
+                <a:effectLst/>
+                <a:latin typeface="+mn-lt"/>
+                <a:ea typeface="+mn-ea"/>
+                <a:cs typeface="+mn-cs"/>
+              </a:rPr>
+              <a:t>UserId</a:t>
+            </a:r>
+            <a:r>
+              <a:rPr lang="de-DE" sz="1200" b="0" kern="1200" baseline="0" dirty="0">
+                <a:solidFill>
+                  <a:schemeClr val="tx1"/>
+                </a:solidFill>
+                <a:effectLst/>
+                <a:latin typeface="+mn-lt"/>
+                <a:ea typeface="+mn-ea"/>
+                <a:cs typeface="+mn-cs"/>
+              </a:rPr>
+              <a:t>, Token und das benötigte Recht an den </a:t>
+            </a:r>
+            <a:r>
+              <a:rPr lang="de-DE" sz="1200" b="0" kern="1200" baseline="0" dirty="0" err="1">
+                <a:solidFill>
+                  <a:schemeClr val="tx1"/>
+                </a:solidFill>
+                <a:effectLst/>
+                <a:latin typeface="+mn-lt"/>
+                <a:ea typeface="+mn-ea"/>
+                <a:cs typeface="+mn-cs"/>
+              </a:rPr>
+              <a:t>AuthServer</a:t>
+            </a:r>
+            <a:r>
+              <a:rPr lang="de-DE" sz="1200" b="0" kern="1200" baseline="0" dirty="0">
+                <a:solidFill>
+                  <a:schemeClr val="tx1"/>
+                </a:solidFill>
+                <a:effectLst/>
+                <a:latin typeface="+mn-lt"/>
+                <a:ea typeface="+mn-ea"/>
+                <a:cs typeface="+mn-cs"/>
+              </a:rPr>
+              <a:t> (interne Schnittstelle)</a:t>
+            </a:r>
+            <a:endParaRPr lang="de-DE" sz="1200" b="1" kern="1200" baseline="0" dirty="0">
               <a:solidFill>
                 <a:schemeClr val="tx1"/>
               </a:solidFill>
@@ -751,7 +982,104 @@
             </a:endParaRPr>
           </a:p>
           <a:p>
-            <a:endParaRPr lang="de-DE" sz="1200" b="1" kern="1200" dirty="0" smtClean="0">
+            <a:pPr marL="228600" indent="-228600">
+              <a:buAutoNum type="arabicParenBoth"/>
+            </a:pPr>
+            <a:r>
+              <a:rPr lang="de-DE" sz="1200" b="1" kern="1200" baseline="0" dirty="0">
+                <a:solidFill>
+                  <a:schemeClr val="tx1"/>
+                </a:solidFill>
+                <a:effectLst/>
+                <a:latin typeface="+mn-lt"/>
+                <a:ea typeface="+mn-ea"/>
+                <a:cs typeface="+mn-cs"/>
+              </a:rPr>
+              <a:t>Antwort des </a:t>
+            </a:r>
+            <a:r>
+              <a:rPr lang="de-DE" sz="1200" b="1" kern="1200" baseline="0" dirty="0" err="1">
+                <a:solidFill>
+                  <a:schemeClr val="tx1"/>
+                </a:solidFill>
+                <a:effectLst/>
+                <a:latin typeface="+mn-lt"/>
+                <a:ea typeface="+mn-ea"/>
+                <a:cs typeface="+mn-cs"/>
+              </a:rPr>
+              <a:t>Microservice</a:t>
+            </a:r>
+            <a:br>
+              <a:rPr lang="de-DE" sz="1200" b="1" kern="1200" baseline="0" dirty="0">
+                <a:solidFill>
+                  <a:schemeClr val="tx1"/>
+                </a:solidFill>
+                <a:effectLst/>
+                <a:latin typeface="+mn-lt"/>
+                <a:ea typeface="+mn-ea"/>
+                <a:cs typeface="+mn-cs"/>
+              </a:rPr>
+            </a:br>
+            <a:r>
+              <a:rPr lang="de-DE" sz="1200" b="0" kern="1200" baseline="0" dirty="0">
+                <a:solidFill>
+                  <a:schemeClr val="tx1"/>
+                </a:solidFill>
+                <a:effectLst/>
+                <a:latin typeface="+mn-lt"/>
+                <a:ea typeface="+mn-ea"/>
+                <a:cs typeface="+mn-cs"/>
+              </a:rPr>
+              <a:t>Waren Token und Rechte des Clients valide, antwortet der </a:t>
+            </a:r>
+            <a:r>
+              <a:rPr lang="de-DE" sz="1200" b="0" kern="1200" baseline="0" dirty="0" err="1">
+                <a:solidFill>
+                  <a:schemeClr val="tx1"/>
+                </a:solidFill>
+                <a:effectLst/>
+                <a:latin typeface="+mn-lt"/>
+                <a:ea typeface="+mn-ea"/>
+                <a:cs typeface="+mn-cs"/>
+              </a:rPr>
+              <a:t>Microservice</a:t>
+            </a:r>
+            <a:r>
+              <a:rPr lang="de-DE" sz="1200" b="0" kern="1200" baseline="0" dirty="0">
+                <a:solidFill>
+                  <a:schemeClr val="tx1"/>
+                </a:solidFill>
+                <a:effectLst/>
+                <a:latin typeface="+mn-lt"/>
+                <a:ea typeface="+mn-ea"/>
+                <a:cs typeface="+mn-cs"/>
+              </a:rPr>
+              <a:t> mit dem passenden Ergebnis.</a:t>
+            </a:r>
+            <a:br>
+              <a:rPr lang="de-DE" sz="1200" b="0" kern="1200" baseline="0" dirty="0">
+                <a:solidFill>
+                  <a:schemeClr val="tx1"/>
+                </a:solidFill>
+                <a:effectLst/>
+                <a:latin typeface="+mn-lt"/>
+                <a:ea typeface="+mn-ea"/>
+                <a:cs typeface="+mn-cs"/>
+              </a:rPr>
+            </a:br>
+            <a:r>
+              <a:rPr lang="de-DE" sz="1200" b="0" kern="1200" baseline="0" dirty="0">
+                <a:solidFill>
+                  <a:schemeClr val="tx1"/>
+                </a:solidFill>
+                <a:effectLst/>
+                <a:latin typeface="+mn-lt"/>
+                <a:ea typeface="+mn-ea"/>
+                <a:cs typeface="+mn-cs"/>
+              </a:rPr>
+              <a:t>Andernfalls übergibt er eine passende Statusinformation was schiefgelaufen ist.</a:t>
+            </a:r>
+            <a:endParaRPr lang="de-DE" sz="1200" b="1" kern="1200" dirty="0">
               <a:solidFill>
                 <a:schemeClr val="tx1"/>
               </a:solidFill>
@@ -762,19 +1090,7 @@
             </a:endParaRPr>
           </a:p>
           <a:p>
-            <a:r>
-              <a:rPr lang="de-DE" sz="1200" b="1" kern="1200" dirty="0" smtClean="0">
-                <a:solidFill>
-                  <a:schemeClr val="tx1"/>
-                </a:solidFill>
-                <a:effectLst/>
-                <a:latin typeface="+mn-lt"/>
-                <a:ea typeface="+mn-ea"/>
-                <a:cs typeface="+mn-cs"/>
-              </a:rPr>
-              <a:t>Vereinfachung:</a:t>
-            </a:r>
-            <a:endParaRPr lang="de-DE" sz="1200" kern="1200" dirty="0" smtClean="0">
+            <a:endParaRPr lang="de-DE" sz="1200" b="1" kern="1200" dirty="0">
               <a:solidFill>
                 <a:schemeClr val="tx1"/>
               </a:solidFill>
@@ -786,7 +1102,19 @@
           </a:p>
           <a:p>
             <a:r>
-              <a:rPr lang="de-DE" sz="1200" kern="1200" dirty="0" smtClean="0">
+              <a:rPr lang="de-DE" sz="1200" b="1" kern="1200" dirty="0">
+                <a:solidFill>
+                  <a:schemeClr val="tx1"/>
+                </a:solidFill>
+                <a:effectLst/>
+                <a:latin typeface="+mn-lt"/>
+                <a:ea typeface="+mn-ea"/>
+                <a:cs typeface="+mn-cs"/>
+              </a:rPr>
+              <a:t>Vereinfachung:</a:t>
+            </a:r>
+            <a:r>
+              <a:rPr lang="de-DE" sz="1200" kern="1200" dirty="0">
                 <a:solidFill>
                   <a:schemeClr val="tx1"/>
                 </a:solidFill>
@@ -801,7 +1129,7 @@
           <a:p>
             <a:pPr lvl="0"/>
             <a:r>
-              <a:rPr lang="de-DE" sz="1200" kern="1200" dirty="0" smtClean="0">
+              <a:rPr lang="de-DE" sz="1200" kern="1200" dirty="0">
                 <a:solidFill>
                   <a:schemeClr val="tx1"/>
                 </a:solidFill>
@@ -813,7 +1141,7 @@
               <a:t>Der Benutzer muss vor der Verwendung der </a:t>
             </a:r>
             <a:r>
-              <a:rPr lang="de-DE" sz="1200" kern="1200" dirty="0" err="1" smtClean="0">
+              <a:rPr lang="de-DE" sz="1200" kern="1200" dirty="0" err="1">
                 <a:solidFill>
                   <a:schemeClr val="tx1"/>
                 </a:solidFill>
@@ -825,7 +1153,7 @@
               <a:t>Microservices</a:t>
             </a:r>
             <a:r>
-              <a:rPr lang="de-DE" sz="1200" kern="1200" dirty="0" smtClean="0">
+              <a:rPr lang="de-DE" sz="1200" kern="1200" dirty="0">
                 <a:solidFill>
                   <a:schemeClr val="tx1"/>
                 </a:solidFill>
@@ -834,10 +1162,25 @@
                 <a:ea typeface="+mn-ea"/>
                 <a:cs typeface="+mn-cs"/>
               </a:rPr>
-              <a:t> authentifiziert werden, z.B. beim Login. Es erfolgt keine automatische Weiterleitung von den </a:t>
-            </a:r>
-            <a:r>
-              <a:rPr lang="de-DE" sz="1200" kern="1200" dirty="0" err="1" smtClean="0">
+              <a:t> authentifiziert werden, z.B. beim Login.</a:t>
+            </a:r>
+          </a:p>
+          <a:p>
+            <a:pPr lvl="0"/>
+            <a:r>
+              <a:rPr lang="de-DE" sz="1200" kern="1200" dirty="0">
+                <a:solidFill>
+                  <a:schemeClr val="tx1"/>
+                </a:solidFill>
+                <a:effectLst/>
+                <a:latin typeface="+mn-lt"/>
+                <a:ea typeface="+mn-ea"/>
+                <a:cs typeface="+mn-cs"/>
+              </a:rPr>
+              <a:t>Es erfolgt keine automatische Weiterleitung von den </a:t>
+            </a:r>
+            <a:r>
+              <a:rPr lang="de-DE" sz="1200" kern="1200" dirty="0" err="1">
                 <a:solidFill>
                   <a:schemeClr val="tx1"/>
                 </a:solidFill>
@@ -849,7 +1192,7 @@
               <a:t>Microservices</a:t>
             </a:r>
             <a:r>
-              <a:rPr lang="de-DE" sz="1200" kern="1200" dirty="0" smtClean="0">
+              <a:rPr lang="de-DE" sz="1200" kern="1200" dirty="0">
                 <a:solidFill>
                   <a:schemeClr val="tx1"/>
                 </a:solidFill>
@@ -861,7 +1204,7 @@
               <a:t> zum </a:t>
             </a:r>
             <a:r>
-              <a:rPr lang="de-DE" sz="1200" kern="1200" dirty="0" err="1" smtClean="0">
+              <a:rPr lang="de-DE" sz="1200" kern="1200" dirty="0" err="1">
                 <a:solidFill>
                   <a:schemeClr val="tx1"/>
                 </a:solidFill>
@@ -873,7 +1216,7 @@
               <a:t>AuthServer</a:t>
             </a:r>
             <a:r>
-              <a:rPr lang="de-DE" sz="1200" kern="1200" dirty="0" smtClean="0">
+              <a:rPr lang="de-DE" sz="1200" kern="1200" dirty="0">
                 <a:solidFill>
                   <a:schemeClr val="tx1"/>
                 </a:solidFill>
@@ -882,13 +1225,13 @@
                 <a:ea typeface="+mn-ea"/>
                 <a:cs typeface="+mn-cs"/>
               </a:rPr>
-              <a:t>. </a:t>
+              <a:t>. (Also wenn User nicht eingeloggt ist wird er nicht automatisch weitergeleitet um sich einzuloggen)</a:t>
             </a:r>
           </a:p>
           <a:p>
             <a:pPr lvl="0"/>
             <a:r>
-              <a:rPr lang="de-DE" sz="1200" kern="1200" dirty="0" smtClean="0">
+              <a:rPr lang="de-DE" sz="1200" kern="1200" dirty="0">
                 <a:solidFill>
                   <a:schemeClr val="tx1"/>
                 </a:solidFill>
@@ -985,35 +1328,42 @@
           <a:bodyPr/>
           <a:lstStyle/>
           <a:p>
-            <a:r>
-              <a:rPr lang="de-DE" dirty="0" err="1" smtClean="0"/>
-              <a:t>Authorization</a:t>
-            </a:r>
-            <a:r>
-              <a:rPr lang="de-DE" baseline="0" dirty="0" smtClean="0"/>
-              <a:t> Group enthält </a:t>
-            </a:r>
-            <a:r>
-              <a:rPr lang="de-DE" baseline="0" dirty="0" err="1" smtClean="0"/>
-              <a:t>Authorizations</a:t>
-            </a:r>
-            <a:r>
-              <a:rPr lang="de-DE" baseline="0" dirty="0" smtClean="0"/>
-              <a:t>. Beliebe viele.</a:t>
-            </a:r>
-          </a:p>
-          <a:p>
-            <a:r>
-              <a:rPr lang="de-DE" baseline="0" dirty="0" err="1" smtClean="0"/>
-              <a:t>Authorizations</a:t>
-            </a:r>
-            <a:r>
-              <a:rPr lang="de-DE" baseline="0" dirty="0" smtClean="0"/>
-              <a:t> können beispielsweise sein </a:t>
-            </a:r>
-            <a:r>
-              <a:rPr lang="de-DE" baseline="0" dirty="0" err="1" smtClean="0"/>
+            <a:pPr algn="l"/>
+            <a:r>
+              <a:rPr lang="de-DE" dirty="0"/>
+              <a:t>Ein Benutzer besitzt einen eindeutigen </a:t>
+            </a:r>
+            <a:r>
+              <a:rPr lang="de-DE" dirty="0" err="1"/>
+              <a:t>AccessToken</a:t>
+            </a:r>
+            <a:r>
+              <a:rPr lang="de-DE" dirty="0"/>
+              <a:t> mit „Lebensdauer“.</a:t>
+            </a:r>
+          </a:p>
+          <a:p>
+            <a:r>
+              <a:rPr lang="de-DE" dirty="0"/>
+              <a:t>Ein Benutzer kann einer oder mehrerer Autorisierungsgruppen zugeteilt sein.</a:t>
+            </a:r>
+          </a:p>
+          <a:p>
+            <a:r>
+              <a:rPr lang="de-DE" dirty="0"/>
+              <a:t>Diesen Gruppen können beliebig viele Autorisierungen (also Rechte) zugeteilt sein.  </a:t>
+            </a:r>
+            <a:r>
+              <a:rPr lang="de-DE" baseline="0" dirty="0"/>
+              <a:t>Ein Recht könnte beispielsweise ‚</a:t>
+            </a:r>
+            <a:r>
+              <a:rPr lang="de-DE" baseline="0" dirty="0" err="1"/>
               <a:t>media.books.create</a:t>
+            </a:r>
+            <a:r>
+              <a:rPr lang="de-DE" baseline="0" dirty="0"/>
+              <a:t>‘ sein.</a:t>
             </a:r>
             <a:endParaRPr lang="de-DE" dirty="0"/>
           </a:p>
@@ -1100,20 +1450,32 @@
           <a:lstStyle/>
           <a:p>
             <a:r>
-              <a:rPr lang="de-DE" dirty="0" smtClean="0"/>
+              <a:rPr lang="de-DE" dirty="0"/>
               <a:t>Aufteilung</a:t>
             </a:r>
             <a:r>
-              <a:rPr lang="de-DE" baseline="0" dirty="0" smtClean="0"/>
-              <a:t> in </a:t>
-            </a:r>
-            <a:r>
-              <a:rPr lang="de-DE" baseline="0" dirty="0" err="1" smtClean="0"/>
-              <a:t>Exterme</a:t>
-            </a:r>
-            <a:r>
-              <a:rPr lang="de-DE" baseline="0" dirty="0" smtClean="0"/>
-              <a:t> (links) und Interne (rechts) Schnittstellen.</a:t>
+              <a:rPr lang="de-DE" baseline="0" dirty="0"/>
+              <a:t> in Externe (links) und Interne (rechts) Schnittstellen.</a:t>
+            </a:r>
+          </a:p>
+          <a:p>
+            <a:r>
+              <a:rPr lang="de-DE" baseline="0" dirty="0"/>
+              <a:t>An der externen Schnittstelle kann sich ein Client authentifizieren lassen, also ein Token erstellen lassen.</a:t>
+            </a:r>
+          </a:p>
+          <a:p>
+            <a:r>
+              <a:rPr lang="de-DE" baseline="0" dirty="0"/>
+              <a:t>An der internen Schnittstelle kann ein </a:t>
+            </a:r>
+            <a:r>
+              <a:rPr lang="de-DE" baseline="0" dirty="0" err="1"/>
+              <a:t>Microservice</a:t>
+            </a:r>
+            <a:r>
+              <a:rPr lang="de-DE" baseline="0" dirty="0"/>
+              <a:t> einen Client validieren.</a:t>
             </a:r>
             <a:endParaRPr lang="de-DE" dirty="0"/>
           </a:p>
@@ -1281,10 +1643,9 @@
           </a:lstStyle>
           <a:p>
             <a:r>
-              <a:rPr lang="de-DE" smtClean="0"/>
+              <a:rPr lang="de-DE"/>
               <a:t>Mastertitelformat bearbeiten</a:t>
             </a:r>
-            <a:endParaRPr lang="de-DE"/>
           </a:p>
         </p:txBody>
       </p:sp>
@@ -1346,10 +1707,9 @@
           </a:lstStyle>
           <a:p>
             <a:r>
-              <a:rPr lang="de-DE" smtClean="0"/>
+              <a:rPr lang="de-DE"/>
               <a:t>Master-Untertitelformat bearbeiten</a:t>
             </a:r>
-            <a:endParaRPr lang="de-DE"/>
           </a:p>
         </p:txBody>
       </p:sp>
@@ -1370,7 +1730,7 @@
           <a:p>
             <a:fld id="{A948E3CB-05B0-9B4E-8150-5620B1D4372B}" type="datetimeFigureOut">
               <a:rPr lang="de-DE" smtClean="0"/>
-              <a:t>14.05.17</a:t>
+              <a:t>14.05.2017</a:t>
             </a:fld>
             <a:endParaRPr lang="de-DE"/>
           </a:p>
@@ -1428,13 +1788,6 @@
   <p:clrMapOvr>
     <a:masterClrMapping/>
   </p:clrMapOvr>
-  <p:timing>
-    <p:tnLst>
-      <p:par>
-        <p:cTn id="1" dur="indefinite" restart="never" nodeType="tmRoot"/>
-      </p:par>
-    </p:tnLst>
-  </p:timing>
 </p:sldLayout>
 </file>
 
@@ -1471,10 +1824,9 @@
           <a:lstStyle/>
           <a:p>
             <a:r>
-              <a:rPr lang="de-DE" smtClean="0"/>
+              <a:rPr lang="de-DE"/>
               <a:t>Mastertitelformat bearbeiten</a:t>
             </a:r>
-            <a:endParaRPr lang="de-DE"/>
           </a:p>
         </p:txBody>
       </p:sp>
@@ -1495,38 +1847,37 @@
           <a:p>
             <a:pPr lvl="0"/>
             <a:r>
-              <a:rPr lang="de-DE" smtClean="0"/>
+              <a:rPr lang="de-DE"/>
               <a:t>Mastertextformat bearbeiten</a:t>
             </a:r>
           </a:p>
           <a:p>
             <a:pPr lvl="1"/>
             <a:r>
-              <a:rPr lang="de-DE" smtClean="0"/>
+              <a:rPr lang="de-DE"/>
               <a:t>Zweite Ebene</a:t>
             </a:r>
           </a:p>
           <a:p>
             <a:pPr lvl="2"/>
             <a:r>
-              <a:rPr lang="de-DE" smtClean="0"/>
+              <a:rPr lang="de-DE"/>
               <a:t>Dritte Ebene</a:t>
             </a:r>
           </a:p>
           <a:p>
             <a:pPr lvl="3"/>
             <a:r>
-              <a:rPr lang="de-DE" smtClean="0"/>
+              <a:rPr lang="de-DE"/>
               <a:t>Vierte Ebene</a:t>
             </a:r>
           </a:p>
           <a:p>
             <a:pPr lvl="4"/>
             <a:r>
-              <a:rPr lang="de-DE" smtClean="0"/>
+              <a:rPr lang="de-DE"/>
               <a:t>Fünfte Ebene</a:t>
             </a:r>
-            <a:endParaRPr lang="de-DE"/>
           </a:p>
         </p:txBody>
       </p:sp>
@@ -1547,7 +1898,7 @@
           <a:p>
             <a:fld id="{A948E3CB-05B0-9B4E-8150-5620B1D4372B}" type="datetimeFigureOut">
               <a:rPr lang="de-DE" smtClean="0"/>
-              <a:t>14.05.17</a:t>
+              <a:t>14.05.2017</a:t>
             </a:fld>
             <a:endParaRPr lang="de-DE"/>
           </a:p>
@@ -1646,10 +1997,9 @@
           <a:lstStyle/>
           <a:p>
             <a:r>
-              <a:rPr lang="de-DE" smtClean="0"/>
+              <a:rPr lang="de-DE"/>
               <a:t>Mastertitelformat bearbeiten</a:t>
             </a:r>
-            <a:endParaRPr lang="de-DE"/>
           </a:p>
         </p:txBody>
       </p:sp>
@@ -1675,38 +2025,37 @@
           <a:p>
             <a:pPr lvl="0"/>
             <a:r>
-              <a:rPr lang="de-DE" smtClean="0"/>
+              <a:rPr lang="de-DE"/>
               <a:t>Mastertextformat bearbeiten</a:t>
             </a:r>
           </a:p>
           <a:p>
             <a:pPr lvl="1"/>
             <a:r>
-              <a:rPr lang="de-DE" smtClean="0"/>
+              <a:rPr lang="de-DE"/>
               <a:t>Zweite Ebene</a:t>
             </a:r>
           </a:p>
           <a:p>
             <a:pPr lvl="2"/>
             <a:r>
-              <a:rPr lang="de-DE" smtClean="0"/>
+              <a:rPr lang="de-DE"/>
               <a:t>Dritte Ebene</a:t>
             </a:r>
           </a:p>
           <a:p>
             <a:pPr lvl="3"/>
             <a:r>
-              <a:rPr lang="de-DE" smtClean="0"/>
+              <a:rPr lang="de-DE"/>
               <a:t>Vierte Ebene</a:t>
             </a:r>
           </a:p>
           <a:p>
             <a:pPr lvl="4"/>
             <a:r>
-              <a:rPr lang="de-DE" smtClean="0"/>
+              <a:rPr lang="de-DE"/>
               <a:t>Fünfte Ebene</a:t>
             </a:r>
-            <a:endParaRPr lang="de-DE"/>
           </a:p>
         </p:txBody>
       </p:sp>
@@ -1727,7 +2076,7 @@
           <a:p>
             <a:fld id="{A948E3CB-05B0-9B4E-8150-5620B1D4372B}" type="datetimeFigureOut">
               <a:rPr lang="de-DE" smtClean="0"/>
-              <a:t>14.05.17</a:t>
+              <a:t>14.05.2017</a:t>
             </a:fld>
             <a:endParaRPr lang="de-DE"/>
           </a:p>
@@ -1821,10 +2170,9 @@
           <a:lstStyle/>
           <a:p>
             <a:r>
-              <a:rPr lang="de-DE" smtClean="0"/>
+              <a:rPr lang="de-DE"/>
               <a:t>Mastertitelformat bearbeiten</a:t>
             </a:r>
-            <a:endParaRPr lang="de-DE"/>
           </a:p>
         </p:txBody>
       </p:sp>
@@ -1845,38 +2193,37 @@
           <a:p>
             <a:pPr lvl="0"/>
             <a:r>
-              <a:rPr lang="de-DE" smtClean="0"/>
+              <a:rPr lang="de-DE"/>
               <a:t>Mastertextformat bearbeiten</a:t>
             </a:r>
           </a:p>
           <a:p>
             <a:pPr lvl="1"/>
             <a:r>
-              <a:rPr lang="de-DE" smtClean="0"/>
+              <a:rPr lang="de-DE"/>
               <a:t>Zweite Ebene</a:t>
             </a:r>
           </a:p>
           <a:p>
             <a:pPr lvl="2"/>
             <a:r>
-              <a:rPr lang="de-DE" smtClean="0"/>
+              <a:rPr lang="de-DE"/>
               <a:t>Dritte Ebene</a:t>
             </a:r>
           </a:p>
           <a:p>
             <a:pPr lvl="3"/>
             <a:r>
-              <a:rPr lang="de-DE" smtClean="0"/>
+              <a:rPr lang="de-DE"/>
               <a:t>Vierte Ebene</a:t>
             </a:r>
           </a:p>
           <a:p>
             <a:pPr lvl="4"/>
             <a:r>
-              <a:rPr lang="de-DE" smtClean="0"/>
+              <a:rPr lang="de-DE"/>
               <a:t>Fünfte Ebene</a:t>
             </a:r>
-            <a:endParaRPr lang="de-DE"/>
           </a:p>
         </p:txBody>
       </p:sp>
@@ -1897,7 +2244,7 @@
           <a:p>
             <a:fld id="{A948E3CB-05B0-9B4E-8150-5620B1D4372B}" type="datetimeFigureOut">
               <a:rPr lang="de-DE" smtClean="0"/>
-              <a:t>14.05.17</a:t>
+              <a:t>14.05.2017</a:t>
             </a:fld>
             <a:endParaRPr lang="de-DE" dirty="0"/>
           </a:p>
@@ -1960,14 +2307,13 @@
           </a:lstStyle>
           <a:p>
             <a:r>
-              <a:rPr lang="de-DE" dirty="0" smtClean="0"/>
+              <a:rPr lang="de-DE" dirty="0"/>
               <a:t>Tobias Huber, Christian Keller, Michael Fischer, </a:t>
             </a:r>
             <a:r>
-              <a:rPr lang="de-DE" smtClean="0"/>
+              <a:rPr lang="de-DE"/>
               <a:t>Andreas Neumeier</a:t>
             </a:r>
-            <a:endParaRPr lang="de-DE"/>
           </a:p>
         </p:txBody>
       </p:sp>
@@ -1981,13 +2327,6 @@
   <p:clrMapOvr>
     <a:masterClrMapping/>
   </p:clrMapOvr>
-  <p:timing>
-    <p:tnLst>
-      <p:par>
-        <p:cTn id="1" dur="indefinite" restart="never" nodeType="tmRoot"/>
-      </p:par>
-    </p:tnLst>
-  </p:timing>
 </p:sldLayout>
 </file>
 
@@ -2033,10 +2372,9 @@
           </a:lstStyle>
           <a:p>
             <a:r>
-              <a:rPr lang="de-DE" smtClean="0"/>
+              <a:rPr lang="de-DE"/>
               <a:t>Mastertitelformat bearbeiten</a:t>
             </a:r>
-            <a:endParaRPr lang="de-DE"/>
           </a:p>
         </p:txBody>
       </p:sp>
@@ -2153,7 +2491,7 @@
           <a:p>
             <a:pPr lvl="0"/>
             <a:r>
-              <a:rPr lang="de-DE" smtClean="0"/>
+              <a:rPr lang="de-DE"/>
               <a:t>Mastertextformat bearbeiten</a:t>
             </a:r>
           </a:p>
@@ -2176,7 +2514,7 @@
           <a:p>
             <a:fld id="{A948E3CB-05B0-9B4E-8150-5620B1D4372B}" type="datetimeFigureOut">
               <a:rPr lang="de-DE" smtClean="0"/>
-              <a:t>14.05.17</a:t>
+              <a:t>14.05.2017</a:t>
             </a:fld>
             <a:endParaRPr lang="de-DE"/>
           </a:p>
@@ -2270,10 +2608,9 @@
           <a:lstStyle/>
           <a:p>
             <a:r>
-              <a:rPr lang="de-DE" smtClean="0"/>
+              <a:rPr lang="de-DE"/>
               <a:t>Mastertitelformat bearbeiten</a:t>
             </a:r>
-            <a:endParaRPr lang="de-DE"/>
           </a:p>
         </p:txBody>
       </p:sp>
@@ -2299,38 +2636,37 @@
           <a:p>
             <a:pPr lvl="0"/>
             <a:r>
-              <a:rPr lang="de-DE" smtClean="0"/>
+              <a:rPr lang="de-DE"/>
               <a:t>Mastertextformat bearbeiten</a:t>
             </a:r>
           </a:p>
           <a:p>
             <a:pPr lvl="1"/>
             <a:r>
-              <a:rPr lang="de-DE" smtClean="0"/>
+              <a:rPr lang="de-DE"/>
               <a:t>Zweite Ebene</a:t>
             </a:r>
           </a:p>
           <a:p>
             <a:pPr lvl="2"/>
             <a:r>
-              <a:rPr lang="de-DE" smtClean="0"/>
+              <a:rPr lang="de-DE"/>
               <a:t>Dritte Ebene</a:t>
             </a:r>
           </a:p>
           <a:p>
             <a:pPr lvl="3"/>
             <a:r>
-              <a:rPr lang="de-DE" smtClean="0"/>
+              <a:rPr lang="de-DE"/>
               <a:t>Vierte Ebene</a:t>
             </a:r>
           </a:p>
           <a:p>
             <a:pPr lvl="4"/>
             <a:r>
-              <a:rPr lang="de-DE" smtClean="0"/>
+              <a:rPr lang="de-DE"/>
               <a:t>Fünfte Ebene</a:t>
             </a:r>
-            <a:endParaRPr lang="de-DE"/>
           </a:p>
         </p:txBody>
       </p:sp>
@@ -2356,38 +2692,37 @@
           <a:p>
             <a:pPr lvl="0"/>
             <a:r>
-              <a:rPr lang="de-DE" smtClean="0"/>
+              <a:rPr lang="de-DE"/>
               <a:t>Mastertextformat bearbeiten</a:t>
             </a:r>
           </a:p>
           <a:p>
             <a:pPr lvl="1"/>
             <a:r>
-              <a:rPr lang="de-DE" smtClean="0"/>
+              <a:rPr lang="de-DE"/>
               <a:t>Zweite Ebene</a:t>
             </a:r>
           </a:p>
           <a:p>
             <a:pPr lvl="2"/>
             <a:r>
-              <a:rPr lang="de-DE" smtClean="0"/>
+              <a:rPr lang="de-DE"/>
               <a:t>Dritte Ebene</a:t>
             </a:r>
           </a:p>
           <a:p>
             <a:pPr lvl="3"/>
             <a:r>
-              <a:rPr lang="de-DE" smtClean="0"/>
+              <a:rPr lang="de-DE"/>
               <a:t>Vierte Ebene</a:t>
             </a:r>
           </a:p>
           <a:p>
             <a:pPr lvl="4"/>
             <a:r>
-              <a:rPr lang="de-DE" smtClean="0"/>
+              <a:rPr lang="de-DE"/>
               <a:t>Fünfte Ebene</a:t>
             </a:r>
-            <a:endParaRPr lang="de-DE"/>
           </a:p>
         </p:txBody>
       </p:sp>
@@ -2408,7 +2743,7 @@
           <a:p>
             <a:fld id="{A948E3CB-05B0-9B4E-8150-5620B1D4372B}" type="datetimeFigureOut">
               <a:rPr lang="de-DE" smtClean="0"/>
-              <a:t>14.05.17</a:t>
+              <a:t>14.05.2017</a:t>
             </a:fld>
             <a:endParaRPr lang="de-DE"/>
           </a:p>
@@ -2507,10 +2842,9 @@
           <a:lstStyle/>
           <a:p>
             <a:r>
-              <a:rPr lang="de-DE" smtClean="0"/>
+              <a:rPr lang="de-DE"/>
               <a:t>Mastertitelformat bearbeiten</a:t>
             </a:r>
-            <a:endParaRPr lang="de-DE"/>
           </a:p>
         </p:txBody>
       </p:sp>
@@ -2573,7 +2907,7 @@
           <a:p>
             <a:pPr lvl="0"/>
             <a:r>
-              <a:rPr lang="de-DE" smtClean="0"/>
+              <a:rPr lang="de-DE"/>
               <a:t>Mastertextformat bearbeiten</a:t>
             </a:r>
           </a:p>
@@ -2601,38 +2935,37 @@
           <a:p>
             <a:pPr lvl="0"/>
             <a:r>
-              <a:rPr lang="de-DE" smtClean="0"/>
+              <a:rPr lang="de-DE"/>
               <a:t>Mastertextformat bearbeiten</a:t>
             </a:r>
           </a:p>
           <a:p>
             <a:pPr lvl="1"/>
             <a:r>
-              <a:rPr lang="de-DE" smtClean="0"/>
+              <a:rPr lang="de-DE"/>
               <a:t>Zweite Ebene</a:t>
             </a:r>
           </a:p>
           <a:p>
             <a:pPr lvl="2"/>
             <a:r>
-              <a:rPr lang="de-DE" smtClean="0"/>
+              <a:rPr lang="de-DE"/>
               <a:t>Dritte Ebene</a:t>
             </a:r>
           </a:p>
           <a:p>
             <a:pPr lvl="3"/>
             <a:r>
-              <a:rPr lang="de-DE" smtClean="0"/>
+              <a:rPr lang="de-DE"/>
               <a:t>Vierte Ebene</a:t>
             </a:r>
           </a:p>
           <a:p>
             <a:pPr lvl="4"/>
             <a:r>
-              <a:rPr lang="de-DE" smtClean="0"/>
+              <a:rPr lang="de-DE"/>
               <a:t>Fünfte Ebene</a:t>
             </a:r>
-            <a:endParaRPr lang="de-DE"/>
           </a:p>
         </p:txBody>
       </p:sp>
@@ -2695,7 +3028,7 @@
           <a:p>
             <a:pPr lvl="0"/>
             <a:r>
-              <a:rPr lang="de-DE" smtClean="0"/>
+              <a:rPr lang="de-DE"/>
               <a:t>Mastertextformat bearbeiten</a:t>
             </a:r>
           </a:p>
@@ -2723,38 +3056,37 @@
           <a:p>
             <a:pPr lvl="0"/>
             <a:r>
-              <a:rPr lang="de-DE" smtClean="0"/>
+              <a:rPr lang="de-DE"/>
               <a:t>Mastertextformat bearbeiten</a:t>
             </a:r>
           </a:p>
           <a:p>
             <a:pPr lvl="1"/>
             <a:r>
-              <a:rPr lang="de-DE" smtClean="0"/>
+              <a:rPr lang="de-DE"/>
               <a:t>Zweite Ebene</a:t>
             </a:r>
           </a:p>
           <a:p>
             <a:pPr lvl="2"/>
             <a:r>
-              <a:rPr lang="de-DE" smtClean="0"/>
+              <a:rPr lang="de-DE"/>
               <a:t>Dritte Ebene</a:t>
             </a:r>
           </a:p>
           <a:p>
             <a:pPr lvl="3"/>
             <a:r>
-              <a:rPr lang="de-DE" smtClean="0"/>
+              <a:rPr lang="de-DE"/>
               <a:t>Vierte Ebene</a:t>
             </a:r>
           </a:p>
           <a:p>
             <a:pPr lvl="4"/>
             <a:r>
-              <a:rPr lang="de-DE" smtClean="0"/>
+              <a:rPr lang="de-DE"/>
               <a:t>Fünfte Ebene</a:t>
             </a:r>
-            <a:endParaRPr lang="de-DE"/>
           </a:p>
         </p:txBody>
       </p:sp>
@@ -2775,7 +3107,7 @@
           <a:p>
             <a:fld id="{A948E3CB-05B0-9B4E-8150-5620B1D4372B}" type="datetimeFigureOut">
               <a:rPr lang="de-DE" smtClean="0"/>
-              <a:t>14.05.17</a:t>
+              <a:t>14.05.2017</a:t>
             </a:fld>
             <a:endParaRPr lang="de-DE"/>
           </a:p>
@@ -2869,10 +3201,9 @@
           <a:lstStyle/>
           <a:p>
             <a:r>
-              <a:rPr lang="de-DE" smtClean="0"/>
+              <a:rPr lang="de-DE"/>
               <a:t>Mastertitelformat bearbeiten</a:t>
             </a:r>
-            <a:endParaRPr lang="de-DE"/>
           </a:p>
         </p:txBody>
       </p:sp>
@@ -2893,7 +3224,7 @@
           <a:p>
             <a:fld id="{A948E3CB-05B0-9B4E-8150-5620B1D4372B}" type="datetimeFigureOut">
               <a:rPr lang="de-DE" smtClean="0"/>
-              <a:t>14.05.17</a:t>
+              <a:t>14.05.2017</a:t>
             </a:fld>
             <a:endParaRPr lang="de-DE"/>
           </a:p>
@@ -2988,7 +3319,7 @@
           <a:p>
             <a:fld id="{A948E3CB-05B0-9B4E-8150-5620B1D4372B}" type="datetimeFigureOut">
               <a:rPr lang="de-DE" smtClean="0"/>
-              <a:t>14.05.17</a:t>
+              <a:t>14.05.2017</a:t>
             </a:fld>
             <a:endParaRPr lang="de-DE"/>
           </a:p>
@@ -3091,10 +3422,9 @@
           </a:lstStyle>
           <a:p>
             <a:r>
-              <a:rPr lang="de-DE" smtClean="0"/>
+              <a:rPr lang="de-DE"/>
               <a:t>Mastertitelformat bearbeiten</a:t>
             </a:r>
-            <a:endParaRPr lang="de-DE"/>
           </a:p>
         </p:txBody>
       </p:sp>
@@ -3148,38 +3478,37 @@
           <a:p>
             <a:pPr lvl="0"/>
             <a:r>
-              <a:rPr lang="de-DE" smtClean="0"/>
+              <a:rPr lang="de-DE"/>
               <a:t>Mastertextformat bearbeiten</a:t>
             </a:r>
           </a:p>
           <a:p>
             <a:pPr lvl="1"/>
             <a:r>
-              <a:rPr lang="de-DE" smtClean="0"/>
+              <a:rPr lang="de-DE"/>
               <a:t>Zweite Ebene</a:t>
             </a:r>
           </a:p>
           <a:p>
             <a:pPr lvl="2"/>
             <a:r>
-              <a:rPr lang="de-DE" smtClean="0"/>
+              <a:rPr lang="de-DE"/>
               <a:t>Dritte Ebene</a:t>
             </a:r>
           </a:p>
           <a:p>
             <a:pPr lvl="3"/>
             <a:r>
-              <a:rPr lang="de-DE" smtClean="0"/>
+              <a:rPr lang="de-DE"/>
               <a:t>Vierte Ebene</a:t>
             </a:r>
           </a:p>
           <a:p>
             <a:pPr lvl="4"/>
             <a:r>
-              <a:rPr lang="de-DE" smtClean="0"/>
+              <a:rPr lang="de-DE"/>
               <a:t>Fünfte Ebene</a:t>
             </a:r>
-            <a:endParaRPr lang="de-DE"/>
           </a:p>
         </p:txBody>
       </p:sp>
@@ -3242,7 +3571,7 @@
           <a:p>
             <a:pPr lvl="0"/>
             <a:r>
-              <a:rPr lang="de-DE" smtClean="0"/>
+              <a:rPr lang="de-DE"/>
               <a:t>Mastertextformat bearbeiten</a:t>
             </a:r>
           </a:p>
@@ -3265,7 +3594,7 @@
           <a:p>
             <a:fld id="{A948E3CB-05B0-9B4E-8150-5620B1D4372B}" type="datetimeFigureOut">
               <a:rPr lang="de-DE" smtClean="0"/>
-              <a:t>14.05.17</a:t>
+              <a:t>14.05.2017</a:t>
             </a:fld>
             <a:endParaRPr lang="de-DE"/>
           </a:p>
@@ -3368,10 +3697,9 @@
           </a:lstStyle>
           <a:p>
             <a:r>
-              <a:rPr lang="de-DE" smtClean="0"/>
+              <a:rPr lang="de-DE"/>
               <a:t>Mastertitelformat bearbeiten</a:t>
             </a:r>
-            <a:endParaRPr lang="de-DE"/>
           </a:p>
         </p:txBody>
       </p:sp>
@@ -3495,7 +3823,7 @@
           <a:p>
             <a:pPr lvl="0"/>
             <a:r>
-              <a:rPr lang="de-DE" smtClean="0"/>
+              <a:rPr lang="de-DE"/>
               <a:t>Mastertextformat bearbeiten</a:t>
             </a:r>
           </a:p>
@@ -3518,7 +3846,7 @@
           <a:p>
             <a:fld id="{A948E3CB-05B0-9B4E-8150-5620B1D4372B}" type="datetimeFigureOut">
               <a:rPr lang="de-DE" smtClean="0"/>
-              <a:t>14.05.17</a:t>
+              <a:t>14.05.2017</a:t>
             </a:fld>
             <a:endParaRPr lang="de-DE"/>
           </a:p>
@@ -3627,10 +3955,9 @@
           <a:lstStyle/>
           <a:p>
             <a:r>
-              <a:rPr lang="de-DE" smtClean="0"/>
+              <a:rPr lang="de-DE"/>
               <a:t>Mastertitelformat bearbeiten</a:t>
             </a:r>
-            <a:endParaRPr lang="de-DE"/>
           </a:p>
         </p:txBody>
       </p:sp>
@@ -3661,38 +3988,37 @@
           <a:p>
             <a:pPr lvl="0"/>
             <a:r>
-              <a:rPr lang="de-DE" smtClean="0"/>
+              <a:rPr lang="de-DE"/>
               <a:t>Mastertextformat bearbeiten</a:t>
             </a:r>
           </a:p>
           <a:p>
             <a:pPr lvl="1"/>
             <a:r>
-              <a:rPr lang="de-DE" smtClean="0"/>
+              <a:rPr lang="de-DE"/>
               <a:t>Zweite Ebene</a:t>
             </a:r>
           </a:p>
           <a:p>
             <a:pPr lvl="2"/>
             <a:r>
-              <a:rPr lang="de-DE" smtClean="0"/>
+              <a:rPr lang="de-DE"/>
               <a:t>Dritte Ebene</a:t>
             </a:r>
           </a:p>
           <a:p>
             <a:pPr lvl="3"/>
             <a:r>
-              <a:rPr lang="de-DE" smtClean="0"/>
+              <a:rPr lang="de-DE"/>
               <a:t>Vierte Ebene</a:t>
             </a:r>
           </a:p>
           <a:p>
             <a:pPr lvl="4"/>
             <a:r>
-              <a:rPr lang="de-DE" smtClean="0"/>
+              <a:rPr lang="de-DE"/>
               <a:t>Fünfte Ebene</a:t>
             </a:r>
-            <a:endParaRPr lang="de-DE"/>
           </a:p>
         </p:txBody>
       </p:sp>
@@ -3731,7 +4057,7 @@
           <a:p>
             <a:fld id="{A948E3CB-05B0-9B4E-8150-5620B1D4372B}" type="datetimeFigureOut">
               <a:rPr lang="de-DE" smtClean="0"/>
-              <a:t>14.05.17</a:t>
+              <a:t>14.05.2017</a:t>
             </a:fld>
             <a:endParaRPr lang="de-DE"/>
           </a:p>
@@ -3771,14 +4097,13 @@
           </a:lstStyle>
           <a:p>
             <a:r>
-              <a:rPr lang="de-DE" dirty="0" smtClean="0"/>
+              <a:rPr lang="de-DE" dirty="0"/>
               <a:t>Tobias Huber, Christian Keller, Michael Fischer, </a:t>
             </a:r>
             <a:r>
-              <a:rPr lang="de-DE" smtClean="0"/>
+              <a:rPr lang="de-DE"/>
               <a:t>Andreas Neumeier</a:t>
             </a:r>
-            <a:endParaRPr lang="de-DE"/>
           </a:p>
         </p:txBody>
       </p:sp>
@@ -3844,13 +4169,6 @@
     <p:sldLayoutId id="2147483658" r:id="rId10"/>
     <p:sldLayoutId id="2147483659" r:id="rId11"/>
   </p:sldLayoutIdLst>
-  <p:timing>
-    <p:tnLst>
-      <p:par>
-        <p:cTn id="1" dur="indefinite" restart="never" nodeType="tmRoot"/>
-      </p:par>
-    </p:tnLst>
-  </p:timing>
   <p:txStyles>
     <p:titleStyle>
       <a:lvl1pPr algn="l" defTabSz="914400" rtl="0" eaLnBrk="1" latinLnBrk="0" hangingPunct="1">
@@ -4167,10 +4485,9 @@
           <a:lstStyle/>
           <a:p>
             <a:r>
-              <a:rPr lang="de-DE" dirty="0" smtClean="0"/>
+              <a:rPr lang="de-DE" dirty="0"/>
               <a:t>Praktikumsaufgabe</a:t>
             </a:r>
-            <a:endParaRPr lang="de-DE" dirty="0"/>
           </a:p>
         </p:txBody>
       </p:sp>
@@ -4192,27 +4509,26 @@
           <a:lstStyle/>
           <a:p>
             <a:r>
-              <a:rPr lang="de-DE" dirty="0" smtClean="0"/>
+              <a:rPr lang="de-DE" dirty="0"/>
               <a:t>Authentication Prozess bei </a:t>
             </a:r>
             <a:r>
-              <a:rPr lang="de-DE" dirty="0" err="1" smtClean="0"/>
+              <a:rPr lang="de-DE" dirty="0" err="1"/>
               <a:t>ShareIt</a:t>
             </a:r>
-            <a:endParaRPr lang="de-DE" dirty="0" smtClean="0"/>
-          </a:p>
-          <a:p>
             <a:endParaRPr lang="de-DE" dirty="0"/>
           </a:p>
           <a:p>
-            <a:endParaRPr lang="de-DE" dirty="0" smtClean="0"/>
-          </a:p>
-          <a:p>
-            <a:r>
-              <a:rPr lang="de-DE" sz="1800" dirty="0" smtClean="0"/>
+            <a:endParaRPr lang="de-DE" dirty="0"/>
+          </a:p>
+          <a:p>
+            <a:endParaRPr lang="de-DE" dirty="0"/>
+          </a:p>
+          <a:p>
+            <a:r>
+              <a:rPr lang="de-DE" sz="1800" dirty="0"/>
               <a:t>Tobias Huber, Christian Keller, Michael Fischer, Andreas Neumeier</a:t>
             </a:r>
-            <a:endParaRPr lang="de-DE" sz="1800" dirty="0"/>
           </a:p>
         </p:txBody>
       </p:sp>
@@ -4226,13 +4542,6 @@
   <p:clrMapOvr>
     <a:masterClrMapping/>
   </p:clrMapOvr>
-  <p:timing>
-    <p:tnLst>
-      <p:par>
-        <p:cTn id="1" dur="indefinite" restart="never" nodeType="tmRoot"/>
-      </p:par>
-    </p:tnLst>
-  </p:timing>
 </p:sld>
 </file>
 
@@ -4269,18 +4578,17 @@
           <a:lstStyle/>
           <a:p>
             <a:r>
-              <a:rPr lang="de-DE" dirty="0" smtClean="0"/>
+              <a:rPr lang="de-DE" dirty="0"/>
               <a:t>Authentifizierung (</a:t>
             </a:r>
             <a:r>
-              <a:rPr lang="de-DE" dirty="0" err="1" smtClean="0"/>
+              <a:rPr lang="de-DE" dirty="0" err="1"/>
               <a:t>OAuth</a:t>
             </a:r>
             <a:r>
-              <a:rPr lang="de-DE" dirty="0" smtClean="0"/>
+              <a:rPr lang="de-DE" dirty="0"/>
               <a:t>)</a:t>
             </a:r>
-            <a:endParaRPr lang="de-DE" dirty="0"/>
           </a:p>
         </p:txBody>
       </p:sp>
@@ -4323,13 +4631,6 @@
   <p:clrMapOvr>
     <a:masterClrMapping/>
   </p:clrMapOvr>
-  <p:timing>
-    <p:tnLst>
-      <p:par>
-        <p:cTn id="1" dur="indefinite" restart="never" nodeType="tmRoot"/>
-      </p:par>
-    </p:tnLst>
-  </p:timing>
 </p:sld>
 </file>
 
@@ -4366,10 +4667,9 @@
           <a:lstStyle/>
           <a:p>
             <a:r>
-              <a:rPr lang="de-DE" dirty="0" smtClean="0"/>
+              <a:rPr lang="de-DE" dirty="0"/>
               <a:t>Datenhaltung</a:t>
             </a:r>
-            <a:endParaRPr lang="de-DE" dirty="0"/>
           </a:p>
         </p:txBody>
       </p:sp>
@@ -4412,13 +4712,6 @@
   <p:clrMapOvr>
     <a:masterClrMapping/>
   </p:clrMapOvr>
-  <p:timing>
-    <p:tnLst>
-      <p:par>
-        <p:cTn id="1" dur="indefinite" restart="never" nodeType="tmRoot"/>
-      </p:par>
-    </p:tnLst>
-  </p:timing>
 </p:sld>
 </file>
 
@@ -4455,14 +4748,13 @@
           <a:lstStyle/>
           <a:p>
             <a:r>
-              <a:rPr lang="de-DE" dirty="0" err="1" smtClean="0"/>
+              <a:rPr lang="de-DE" dirty="0" err="1"/>
               <a:t>AuthServer</a:t>
             </a:r>
             <a:r>
-              <a:rPr lang="de-DE" dirty="0" smtClean="0"/>
+              <a:rPr lang="de-DE" dirty="0"/>
               <a:t> REST Webservices</a:t>
             </a:r>
-            <a:endParaRPr lang="de-DE" dirty="0"/>
           </a:p>
         </p:txBody>
       </p:sp>
@@ -4505,13 +4797,6 @@
   <p:clrMapOvr>
     <a:masterClrMapping/>
   </p:clrMapOvr>
-  <p:timing>
-    <p:tnLst>
-      <p:par>
-        <p:cTn id="1" dur="indefinite" restart="never" nodeType="tmRoot"/>
-      </p:par>
-    </p:tnLst>
-  </p:timing>
 </p:sld>
 </file>
 
@@ -4548,10 +4833,9 @@
           <a:lstStyle/>
           <a:p>
             <a:r>
-              <a:rPr lang="de-DE" dirty="0" smtClean="0"/>
+              <a:rPr lang="de-DE" dirty="0"/>
               <a:t>Umfang	</a:t>
             </a:r>
-            <a:endParaRPr lang="de-DE" dirty="0"/>
           </a:p>
         </p:txBody>
       </p:sp>
@@ -4590,33 +4874,25 @@
               <a:t>Mock Objekte welche an den </a:t>
             </a:r>
             <a:r>
-              <a:rPr lang="de-DE" dirty="0" err="1"/>
-              <a:t>Auth</a:t>
+              <a:rPr lang="de-DE"/>
+              <a:t>AuthService</a:t>
             </a:r>
             <a:r>
               <a:rPr lang="de-DE" dirty="0"/>
-              <a:t>. Service angehängt werden, um Benutzer zu simulieren, da derzeit keine Datenbankanbindung vorhanden ist.</a:t>
+              <a:t> angehängt werden, um Benutzer zu simulieren, da derzeit keine Datenbankanbindung vorhanden ist.</a:t>
             </a:r>
           </a:p>
           <a:p>
             <a:pPr lvl="0"/>
             <a:r>
               <a:rPr lang="de-DE" dirty="0"/>
-              <a:t>Rechtegruppen, welchen die Benutzer zugewiesen werden können. (zuweisen der Gruppen an die Mock Objekte</a:t>
-            </a:r>
-            <a:r>
-              <a:rPr lang="de-DE" dirty="0" smtClean="0"/>
-              <a:t>)</a:t>
+              <a:t>Rechtegruppen, welchen die Benutzer zugewiesen werden können. (zuweisen der Gruppen an die Mock Objekte)</a:t>
             </a:r>
           </a:p>
           <a:p>
             <a:r>
               <a:rPr lang="de-DE" dirty="0"/>
-              <a:t>Media Webservices bezüglich Autorisierung überarbeiten</a:t>
-            </a:r>
-            <a:r>
-              <a:rPr lang="de-DE" dirty="0" smtClean="0"/>
-              <a:t>.</a:t>
+              <a:t>Media Webservices bezüglich Autorisierung überarbeiten.</a:t>
             </a:r>
           </a:p>
           <a:p>
@@ -4625,15 +4901,11 @@
               <a:buChar char="-"/>
             </a:pPr>
             <a:r>
-              <a:rPr lang="de-DE" dirty="0" smtClean="0"/>
-              <a:t>(OPTIONAL) </a:t>
-            </a:r>
-            <a:r>
               <a:rPr lang="de-DE" dirty="0"/>
-              <a:t>Erstellen einer Weboberfläche zum Registrieren von Benutzern</a:t>
-            </a:r>
-            <a:r>
-              <a:rPr lang="de-DE" dirty="0" smtClean="0">
+              <a:t>(OPTIONAL) Erstellen einer Weboberfläche zum Registrieren von Benutzern</a:t>
+            </a:r>
+            <a:r>
+              <a:rPr lang="de-DE" dirty="0">
                 <a:effectLst/>
               </a:rPr>
               <a:t> </a:t>
@@ -4652,13 +4924,6 @@
   <p:clrMapOvr>
     <a:masterClrMapping/>
   </p:clrMapOvr>
-  <p:timing>
-    <p:tnLst>
-      <p:par>
-        <p:cTn id="1" dur="indefinite" restart="never" nodeType="tmRoot"/>
-      </p:par>
-    </p:tnLst>
-  </p:timing>
 </p:sld>
 </file>
 

</xml_diff>

<commit_message>
Bilder aktualisiert in Präsentation und Dokument
</commit_message>
<xml_diff>
--- a/documents/Präsentation.pptx
+++ b/documents/Präsentation.pptx
@@ -216,7 +216,7 @@
           <a:p>
             <a:fld id="{F59F45D9-85FE-8F45-A7E4-176787CD4F9C}" type="datetimeFigureOut">
               <a:rPr lang="de-DE" smtClean="0"/>
-              <a:t>14.05.2017</a:t>
+              <a:t>16.05.17</a:t>
             </a:fld>
             <a:endParaRPr lang="de-DE"/>
           </a:p>
@@ -531,7 +531,7 @@
               <a:buAutoNum type="arabicParenBoth"/>
             </a:pPr>
             <a:r>
-              <a:rPr lang="de-DE" sz="1200" b="1" kern="1200" dirty="0">
+              <a:rPr lang="de-DE" sz="1050" b="1" kern="1200" dirty="0">
                 <a:solidFill>
                   <a:schemeClr val="tx1"/>
                 </a:solidFill>
@@ -543,7 +543,7 @@
               <a:t>Anmelden</a:t>
             </a:r>
             <a:r>
-              <a:rPr lang="de-DE" sz="1200" b="1" kern="1200" baseline="0" dirty="0">
+              <a:rPr lang="de-DE" sz="1050" b="1" kern="1200" baseline="0" dirty="0">
                 <a:solidFill>
                   <a:schemeClr val="tx1"/>
                 </a:solidFill>
@@ -555,7 +555,7 @@
               <a:t> beim Login beispielsweise mit Benutzername und Passwort</a:t>
             </a:r>
             <a:br>
-              <a:rPr lang="de-DE" sz="1200" b="1" kern="1200" baseline="0" dirty="0">
+              <a:rPr lang="de-DE" sz="1050" b="1" kern="1200" baseline="0" dirty="0">
                 <a:solidFill>
                   <a:schemeClr val="tx1"/>
                 </a:solidFill>
@@ -566,7 +566,7 @@
               </a:rPr>
             </a:br>
             <a:r>
-              <a:rPr lang="de-DE" sz="1200" b="0" kern="1200" baseline="0" dirty="0">
+              <a:rPr lang="de-DE" sz="1050" b="0" kern="1200" baseline="0" dirty="0">
                 <a:solidFill>
                   <a:schemeClr val="tx1"/>
                 </a:solidFill>
@@ -578,7 +578,7 @@
               <a:t>Der Authentifizierungsserver erstellt einen Token, welchen er an den Client übergibt</a:t>
             </a:r>
             <a:br>
-              <a:rPr lang="de-DE" sz="1200" b="0" kern="1200" baseline="0" dirty="0">
+              <a:rPr lang="de-DE" sz="1050" b="0" kern="1200" baseline="0" dirty="0">
                 <a:solidFill>
                   <a:schemeClr val="tx1"/>
                 </a:solidFill>
@@ -589,7 +589,7 @@
               </a:rPr>
             </a:br>
             <a:r>
-              <a:rPr lang="de-DE" sz="1200" b="0" kern="1200" baseline="0" dirty="0">
+              <a:rPr lang="de-DE" sz="1050" b="0" kern="1200" baseline="0" dirty="0">
                 <a:solidFill>
                   <a:schemeClr val="tx1"/>
                 </a:solidFill>
@@ -601,7 +601,7 @@
               <a:t>Client frägt hierzu mit seinen Daten an der externen Schnittstelle des </a:t>
             </a:r>
             <a:r>
-              <a:rPr lang="de-DE" sz="1200" b="0" kern="1200" baseline="0" dirty="0" err="1">
+              <a:rPr lang="de-DE" sz="1050" b="0" kern="1200" baseline="0" dirty="0" err="1">
                 <a:solidFill>
                   <a:schemeClr val="tx1"/>
                 </a:solidFill>
@@ -613,7 +613,7 @@
               <a:t>AuthServers</a:t>
             </a:r>
             <a:r>
-              <a:rPr lang="de-DE" sz="1200" b="0" kern="1200" baseline="0" dirty="0">
+              <a:rPr lang="de-DE" sz="1050" b="0" kern="1200" baseline="0" dirty="0">
                 <a:solidFill>
                   <a:schemeClr val="tx1"/>
                 </a:solidFill>
@@ -624,7 +624,7 @@
               </a:rPr>
               <a:t> an</a:t>
             </a:r>
-            <a:endParaRPr lang="de-DE" sz="1200" b="1" kern="1200" baseline="0" dirty="0">
+            <a:endParaRPr lang="de-DE" sz="1050" b="1" kern="1200" baseline="0" dirty="0">
               <a:solidFill>
                 <a:schemeClr val="tx1"/>
               </a:solidFill>
@@ -639,7 +639,7 @@
               <a:buAutoNum type="arabicParenBoth"/>
             </a:pPr>
             <a:r>
-              <a:rPr lang="de-DE" sz="1200" b="1" kern="1200" baseline="0" dirty="0">
+              <a:rPr lang="de-DE" sz="1050" b="1" kern="1200" baseline="0" dirty="0">
                 <a:solidFill>
                   <a:schemeClr val="tx1"/>
                 </a:solidFill>
@@ -651,7 +651,7 @@
               <a:t>Client stellt Anfrage an </a:t>
             </a:r>
             <a:r>
-              <a:rPr lang="de-DE" sz="1200" b="1" kern="1200" baseline="0" dirty="0" err="1">
+              <a:rPr lang="de-DE" sz="1050" b="1" kern="1200" baseline="0" dirty="0" err="1">
                 <a:solidFill>
                   <a:schemeClr val="tx1"/>
                 </a:solidFill>
@@ -662,8 +662,20 @@
               </a:rPr>
               <a:t>Microservice</a:t>
             </a:r>
+            <a:r>
+              <a:rPr lang="de-DE" sz="1050" b="1" kern="1200" baseline="0" dirty="0">
+                <a:solidFill>
+                  <a:schemeClr val="tx1"/>
+                </a:solidFill>
+                <a:effectLst/>
+                <a:latin typeface="+mn-lt"/>
+                <a:ea typeface="+mn-ea"/>
+                <a:cs typeface="+mn-cs"/>
+              </a:rPr>
+              <a:t/>
+            </a:r>
             <a:br>
-              <a:rPr lang="de-DE" sz="1200" b="1" kern="1200" baseline="0" dirty="0">
+              <a:rPr lang="de-DE" sz="1050" b="1" kern="1200" baseline="0" dirty="0">
                 <a:solidFill>
                   <a:schemeClr val="tx1"/>
                 </a:solidFill>
@@ -674,7 +686,7 @@
               </a:rPr>
             </a:br>
             <a:r>
-              <a:rPr lang="de-DE" sz="1200" b="0" kern="1200" baseline="0" dirty="0">
+              <a:rPr lang="de-DE" sz="1050" b="0" kern="1200" baseline="0" dirty="0">
                 <a:solidFill>
                   <a:schemeClr val="tx1"/>
                 </a:solidFill>
@@ -685,7 +697,7 @@
               </a:rPr>
               <a:t>In der Anfrage übergibt der Client auch sein zuvor erhaltenes Token</a:t>
             </a:r>
-            <a:endParaRPr lang="de-DE" sz="1200" b="1" kern="1200" baseline="0" dirty="0">
+            <a:endParaRPr lang="de-DE" sz="1050" b="1" kern="1200" baseline="0" dirty="0">
               <a:solidFill>
                 <a:schemeClr val="tx1"/>
               </a:solidFill>
@@ -700,7 +712,7 @@
               <a:buAutoNum type="arabicParenBoth"/>
             </a:pPr>
             <a:r>
-              <a:rPr lang="de-DE" sz="1200" b="1" kern="1200" baseline="0" dirty="0" err="1">
+              <a:rPr lang="de-DE" sz="1050" b="1" kern="1200" baseline="0" dirty="0" err="1">
                 <a:solidFill>
                   <a:schemeClr val="tx1"/>
                 </a:solidFill>
@@ -712,7 +724,7 @@
               <a:t>Microservice</a:t>
             </a:r>
             <a:r>
-              <a:rPr lang="de-DE" sz="1200" b="1" kern="1200" baseline="0" dirty="0">
+              <a:rPr lang="de-DE" sz="1050" b="1" kern="1200" baseline="0" dirty="0">
                 <a:solidFill>
                   <a:schemeClr val="tx1"/>
                 </a:solidFill>
@@ -724,7 +736,7 @@
               <a:t> validiert Client-Token und Berechtigung am </a:t>
             </a:r>
             <a:r>
-              <a:rPr lang="de-DE" sz="1200" b="1" kern="1200" baseline="0" dirty="0" err="1">
+              <a:rPr lang="de-DE" sz="1050" b="1" kern="1200" baseline="0" dirty="0" err="1">
                 <a:solidFill>
                   <a:schemeClr val="tx1"/>
                 </a:solidFill>
@@ -735,8 +747,20 @@
               </a:rPr>
               <a:t>AuthServer</a:t>
             </a:r>
+            <a:r>
+              <a:rPr lang="de-DE" sz="1050" b="1" kern="1200" baseline="0" dirty="0">
+                <a:solidFill>
+                  <a:schemeClr val="tx1"/>
+                </a:solidFill>
+                <a:effectLst/>
+                <a:latin typeface="+mn-lt"/>
+                <a:ea typeface="+mn-ea"/>
+                <a:cs typeface="+mn-cs"/>
+              </a:rPr>
+              <a:t/>
+            </a:r>
             <a:br>
-              <a:rPr lang="de-DE" sz="1200" b="1" kern="1200" baseline="0" dirty="0">
+              <a:rPr lang="de-DE" sz="1050" b="1" kern="1200" baseline="0" dirty="0">
                 <a:solidFill>
                   <a:schemeClr val="tx1"/>
                 </a:solidFill>
@@ -747,7 +771,7 @@
               </a:rPr>
             </a:br>
             <a:r>
-              <a:rPr lang="de-DE" sz="1200" b="0" kern="1200" baseline="0" dirty="0">
+              <a:rPr lang="de-DE" sz="1050" b="0" kern="1200" baseline="0" dirty="0">
                 <a:solidFill>
                   <a:schemeClr val="tx1"/>
                 </a:solidFill>
@@ -759,7 +783,7 @@
               <a:t>Bevor der </a:t>
             </a:r>
             <a:r>
-              <a:rPr lang="de-DE" sz="1200" b="0" kern="1200" baseline="0" dirty="0" err="1">
+              <a:rPr lang="de-DE" sz="1050" b="0" kern="1200" baseline="0" dirty="0" err="1">
                 <a:solidFill>
                   <a:schemeClr val="tx1"/>
                 </a:solidFill>
@@ -771,7 +795,7 @@
               <a:t>angefrage</a:t>
             </a:r>
             <a:r>
-              <a:rPr lang="de-DE" sz="1200" b="0" kern="1200" baseline="0" dirty="0">
+              <a:rPr lang="de-DE" sz="1050" b="0" kern="1200" baseline="0" dirty="0">
                 <a:solidFill>
                   <a:schemeClr val="tx1"/>
                 </a:solidFill>
@@ -783,7 +807,7 @@
               <a:t> Service seine Dienste leistet, überprüft er am </a:t>
             </a:r>
             <a:r>
-              <a:rPr lang="de-DE" sz="1200" b="0" kern="1200" baseline="0" dirty="0" err="1">
+              <a:rPr lang="de-DE" sz="1050" b="0" kern="1200" baseline="0" dirty="0" err="1">
                 <a:solidFill>
                   <a:schemeClr val="tx1"/>
                 </a:solidFill>
@@ -795,7 +819,7 @@
               <a:t>AuthServer</a:t>
             </a:r>
             <a:r>
-              <a:rPr lang="de-DE" sz="1200" b="0" kern="1200" baseline="0" dirty="0">
+              <a:rPr lang="de-DE" sz="1050" b="0" kern="1200" baseline="0" dirty="0">
                 <a:solidFill>
                   <a:schemeClr val="tx1"/>
                 </a:solidFill>
@@ -807,7 +831,7 @@
               <a:t>:</a:t>
             </a:r>
             <a:br>
-              <a:rPr lang="de-DE" sz="1200" b="0" kern="1200" baseline="0" dirty="0">
+              <a:rPr lang="de-DE" sz="1050" b="0" kern="1200" baseline="0" dirty="0">
                 <a:solidFill>
                   <a:schemeClr val="tx1"/>
                 </a:solidFill>
@@ -818,7 +842,7 @@
               </a:rPr>
             </a:br>
             <a:r>
-              <a:rPr lang="de-DE" sz="1200" b="0" kern="1200" baseline="0" dirty="0">
+              <a:rPr lang="de-DE" sz="1050" b="0" kern="1200" baseline="0" dirty="0">
                 <a:solidFill>
                   <a:schemeClr val="tx1"/>
                 </a:solidFill>
@@ -830,7 +854,7 @@
               <a:t>- ist das Token valide ? (gehört es zum anfragenden User </a:t>
             </a:r>
             <a:r>
-              <a:rPr lang="de-DE" sz="1200" b="0" kern="1200" baseline="0" dirty="0" err="1">
+              <a:rPr lang="de-DE" sz="1050" b="0" kern="1200" baseline="0" dirty="0" err="1">
                 <a:solidFill>
                   <a:schemeClr val="tx1"/>
                 </a:solidFill>
@@ -842,7 +866,7 @@
               <a:t>etc</a:t>
             </a:r>
             <a:r>
-              <a:rPr lang="de-DE" sz="1200" b="0" kern="1200" baseline="0" dirty="0">
+              <a:rPr lang="de-DE" sz="1050" b="0" kern="1200" baseline="0" dirty="0">
                 <a:solidFill>
                   <a:schemeClr val="tx1"/>
                 </a:solidFill>
@@ -854,7 +878,7 @@
               <a:t>)</a:t>
             </a:r>
             <a:br>
-              <a:rPr lang="de-DE" sz="1200" b="0" kern="1200" baseline="0" dirty="0">
+              <a:rPr lang="de-DE" sz="1050" b="0" kern="1200" baseline="0" dirty="0">
                 <a:solidFill>
                   <a:schemeClr val="tx1"/>
                 </a:solidFill>
@@ -865,7 +889,7 @@
               </a:rPr>
             </a:br>
             <a:r>
-              <a:rPr lang="de-DE" sz="1200" b="0" kern="1200" baseline="0" dirty="0">
+              <a:rPr lang="de-DE" sz="1050" b="0" kern="1200" baseline="0" dirty="0">
                 <a:solidFill>
                   <a:schemeClr val="tx1"/>
                 </a:solidFill>
@@ -877,7 +901,7 @@
               <a:t>- besitzt der User die benötigten Rechte? (Diese muss der </a:t>
             </a:r>
             <a:r>
-              <a:rPr lang="de-DE" sz="1200" b="0" kern="1200" baseline="0" dirty="0" err="1">
+              <a:rPr lang="de-DE" sz="1050" b="0" kern="1200" baseline="0" dirty="0" err="1">
                 <a:solidFill>
                   <a:schemeClr val="tx1"/>
                 </a:solidFill>
@@ -889,7 +913,7 @@
               <a:t>Microservice</a:t>
             </a:r>
             <a:r>
-              <a:rPr lang="de-DE" sz="1200" b="0" kern="1200" baseline="0" dirty="0">
+              <a:rPr lang="de-DE" sz="1050" b="0" kern="1200" baseline="0" dirty="0">
                 <a:solidFill>
                   <a:schemeClr val="tx1"/>
                 </a:solidFill>
@@ -901,7 +925,7 @@
               <a:t> mit übergeben)</a:t>
             </a:r>
             <a:br>
-              <a:rPr lang="de-DE" sz="1200" b="0" kern="1200" baseline="0" dirty="0">
+              <a:rPr lang="de-DE" sz="1050" b="0" kern="1200" baseline="0" dirty="0">
                 <a:solidFill>
                   <a:schemeClr val="tx1"/>
                 </a:solidFill>
@@ -912,7 +936,7 @@
               </a:rPr>
             </a:br>
             <a:r>
-              <a:rPr lang="de-DE" sz="1200" b="0" kern="1200" baseline="0" dirty="0">
+              <a:rPr lang="de-DE" sz="1050" b="0" kern="1200" baseline="0" dirty="0">
                 <a:solidFill>
                   <a:schemeClr val="tx1"/>
                 </a:solidFill>
@@ -924,7 +948,7 @@
               <a:t>Dafür schickt er die </a:t>
             </a:r>
             <a:r>
-              <a:rPr lang="de-DE" sz="1200" b="0" kern="1200" baseline="0" dirty="0" err="1">
+              <a:rPr lang="de-DE" sz="1050" b="0" kern="1200" baseline="0" dirty="0" err="1">
                 <a:solidFill>
                   <a:schemeClr val="tx1"/>
                 </a:solidFill>
@@ -936,7 +960,7 @@
               <a:t>UserId</a:t>
             </a:r>
             <a:r>
-              <a:rPr lang="de-DE" sz="1200" b="0" kern="1200" baseline="0" dirty="0">
+              <a:rPr lang="de-DE" sz="1050" b="0" kern="1200" baseline="0" dirty="0">
                 <a:solidFill>
                   <a:schemeClr val="tx1"/>
                 </a:solidFill>
@@ -948,7 +972,7 @@
               <a:t>, Token und das benötigte Recht an den </a:t>
             </a:r>
             <a:r>
-              <a:rPr lang="de-DE" sz="1200" b="0" kern="1200" baseline="0" dirty="0" err="1">
+              <a:rPr lang="de-DE" sz="1050" b="0" kern="1200" baseline="0" dirty="0" err="1">
                 <a:solidFill>
                   <a:schemeClr val="tx1"/>
                 </a:solidFill>
@@ -960,7 +984,7 @@
               <a:t>AuthServer</a:t>
             </a:r>
             <a:r>
-              <a:rPr lang="de-DE" sz="1200" b="0" kern="1200" baseline="0" dirty="0">
+              <a:rPr lang="de-DE" sz="1050" b="0" kern="1200" baseline="0" dirty="0">
                 <a:solidFill>
                   <a:schemeClr val="tx1"/>
                 </a:solidFill>
@@ -971,7 +995,7 @@
               </a:rPr>
               <a:t> (interne Schnittstelle)</a:t>
             </a:r>
-            <a:endParaRPr lang="de-DE" sz="1200" b="1" kern="1200" baseline="0" dirty="0">
+            <a:endParaRPr lang="de-DE" sz="1050" b="1" kern="1200" baseline="0" dirty="0">
               <a:solidFill>
                 <a:schemeClr val="tx1"/>
               </a:solidFill>
@@ -986,7 +1010,7 @@
               <a:buAutoNum type="arabicParenBoth"/>
             </a:pPr>
             <a:r>
-              <a:rPr lang="de-DE" sz="1200" b="1" kern="1200" baseline="0" dirty="0">
+              <a:rPr lang="de-DE" sz="1050" b="1" kern="1200" baseline="0" dirty="0">
                 <a:solidFill>
                   <a:schemeClr val="tx1"/>
                 </a:solidFill>
@@ -998,7 +1022,7 @@
               <a:t>Antwort des </a:t>
             </a:r>
             <a:r>
-              <a:rPr lang="de-DE" sz="1200" b="1" kern="1200" baseline="0" dirty="0" err="1">
+              <a:rPr lang="de-DE" sz="1050" b="1" kern="1200" baseline="0" dirty="0" err="1">
                 <a:solidFill>
                   <a:schemeClr val="tx1"/>
                 </a:solidFill>
@@ -1009,8 +1033,20 @@
               </a:rPr>
               <a:t>Microservice</a:t>
             </a:r>
+            <a:r>
+              <a:rPr lang="de-DE" sz="1050" b="1" kern="1200" baseline="0" dirty="0">
+                <a:solidFill>
+                  <a:schemeClr val="tx1"/>
+                </a:solidFill>
+                <a:effectLst/>
+                <a:latin typeface="+mn-lt"/>
+                <a:ea typeface="+mn-ea"/>
+                <a:cs typeface="+mn-cs"/>
+              </a:rPr>
+              <a:t/>
+            </a:r>
             <a:br>
-              <a:rPr lang="de-DE" sz="1200" b="1" kern="1200" baseline="0" dirty="0">
+              <a:rPr lang="de-DE" sz="1050" b="1" kern="1200" baseline="0" dirty="0">
                 <a:solidFill>
                   <a:schemeClr val="tx1"/>
                 </a:solidFill>
@@ -1021,7 +1057,7 @@
               </a:rPr>
             </a:br>
             <a:r>
-              <a:rPr lang="de-DE" sz="1200" b="0" kern="1200" baseline="0" dirty="0">
+              <a:rPr lang="de-DE" sz="1050" b="0" kern="1200" baseline="0" dirty="0">
                 <a:solidFill>
                   <a:schemeClr val="tx1"/>
                 </a:solidFill>
@@ -1033,7 +1069,7 @@
               <a:t>Waren Token und Rechte des Clients valide, antwortet der </a:t>
             </a:r>
             <a:r>
-              <a:rPr lang="de-DE" sz="1200" b="0" kern="1200" baseline="0" dirty="0" err="1">
+              <a:rPr lang="de-DE" sz="1050" b="0" kern="1200" baseline="0" dirty="0" err="1">
                 <a:solidFill>
                   <a:schemeClr val="tx1"/>
                 </a:solidFill>
@@ -1045,7 +1081,7 @@
               <a:t>Microservice</a:t>
             </a:r>
             <a:r>
-              <a:rPr lang="de-DE" sz="1200" b="0" kern="1200" baseline="0" dirty="0">
+              <a:rPr lang="de-DE" sz="1050" b="0" kern="1200" baseline="0" dirty="0">
                 <a:solidFill>
                   <a:schemeClr val="tx1"/>
                 </a:solidFill>
@@ -1057,7 +1093,7 @@
               <a:t> mit dem passenden Ergebnis.</a:t>
             </a:r>
             <a:br>
-              <a:rPr lang="de-DE" sz="1200" b="0" kern="1200" baseline="0" dirty="0">
+              <a:rPr lang="de-DE" sz="1050" b="0" kern="1200" baseline="0" dirty="0">
                 <a:solidFill>
                   <a:schemeClr val="tx1"/>
                 </a:solidFill>
@@ -1068,7 +1104,7 @@
               </a:rPr>
             </a:br>
             <a:r>
-              <a:rPr lang="de-DE" sz="1200" b="0" kern="1200" baseline="0" dirty="0">
+              <a:rPr lang="de-DE" sz="1050" b="0" kern="1200" baseline="0" dirty="0">
                 <a:solidFill>
                   <a:schemeClr val="tx1"/>
                 </a:solidFill>
@@ -1079,7 +1115,7 @@
               </a:rPr>
               <a:t>Andernfalls übergibt er eine passende Statusinformation was schiefgelaufen ist.</a:t>
             </a:r>
-            <a:endParaRPr lang="de-DE" sz="1200" b="1" kern="1200" dirty="0">
+            <a:endParaRPr lang="de-DE" sz="1050" b="1" kern="1200" dirty="0">
               <a:solidFill>
                 <a:schemeClr val="tx1"/>
               </a:solidFill>
@@ -1090,7 +1126,7 @@
             </a:endParaRPr>
           </a:p>
           <a:p>
-            <a:endParaRPr lang="de-DE" sz="1200" b="1" kern="1200" dirty="0">
+            <a:endParaRPr lang="de-DE" sz="1050" b="1" kern="1200" dirty="0">
               <a:solidFill>
                 <a:schemeClr val="tx1"/>
               </a:solidFill>
@@ -1102,7 +1138,7 @@
           </a:p>
           <a:p>
             <a:r>
-              <a:rPr lang="de-DE" sz="1200" b="1" kern="1200" dirty="0">
+              <a:rPr lang="de-DE" sz="1050" b="1" kern="1200" dirty="0">
                 <a:solidFill>
                   <a:schemeClr val="tx1"/>
                 </a:solidFill>
@@ -1114,7 +1150,7 @@
               <a:t>Vereinfachung:</a:t>
             </a:r>
             <a:r>
-              <a:rPr lang="de-DE" sz="1200" kern="1200" dirty="0">
+              <a:rPr lang="de-DE" sz="1050" kern="1200" dirty="0">
                 <a:solidFill>
                   <a:schemeClr val="tx1"/>
                 </a:solidFill>
@@ -1129,7 +1165,7 @@
           <a:p>
             <a:pPr lvl="0"/>
             <a:r>
-              <a:rPr lang="de-DE" sz="1200" kern="1200" dirty="0">
+              <a:rPr lang="de-DE" sz="1050" kern="1200" dirty="0">
                 <a:solidFill>
                   <a:schemeClr val="tx1"/>
                 </a:solidFill>
@@ -1141,7 +1177,7 @@
               <a:t>Der Benutzer muss vor der Verwendung der </a:t>
             </a:r>
             <a:r>
-              <a:rPr lang="de-DE" sz="1200" kern="1200" dirty="0" err="1">
+              <a:rPr lang="de-DE" sz="1050" kern="1200" dirty="0" err="1">
                 <a:solidFill>
                   <a:schemeClr val="tx1"/>
                 </a:solidFill>
@@ -1153,7 +1189,7 @@
               <a:t>Microservices</a:t>
             </a:r>
             <a:r>
-              <a:rPr lang="de-DE" sz="1200" kern="1200" dirty="0">
+              <a:rPr lang="de-DE" sz="1050" kern="1200" dirty="0">
                 <a:solidFill>
                   <a:schemeClr val="tx1"/>
                 </a:solidFill>
@@ -1168,7 +1204,7 @@
           <a:p>
             <a:pPr lvl="0"/>
             <a:r>
-              <a:rPr lang="de-DE" sz="1200" kern="1200" dirty="0">
+              <a:rPr lang="de-DE" sz="1050" kern="1200" dirty="0">
                 <a:solidFill>
                   <a:schemeClr val="tx1"/>
                 </a:solidFill>
@@ -1180,7 +1216,7 @@
               <a:t>Es erfolgt keine automatische Weiterleitung von den </a:t>
             </a:r>
             <a:r>
-              <a:rPr lang="de-DE" sz="1200" kern="1200" dirty="0" err="1">
+              <a:rPr lang="de-DE" sz="1050" kern="1200" dirty="0" err="1">
                 <a:solidFill>
                   <a:schemeClr val="tx1"/>
                 </a:solidFill>
@@ -1192,7 +1228,7 @@
               <a:t>Microservices</a:t>
             </a:r>
             <a:r>
-              <a:rPr lang="de-DE" sz="1200" kern="1200" dirty="0">
+              <a:rPr lang="de-DE" sz="1050" kern="1200" dirty="0">
                 <a:solidFill>
                   <a:schemeClr val="tx1"/>
                 </a:solidFill>
@@ -1204,7 +1240,7 @@
               <a:t> zum </a:t>
             </a:r>
             <a:r>
-              <a:rPr lang="de-DE" sz="1200" kern="1200" dirty="0" err="1">
+              <a:rPr lang="de-DE" sz="1050" kern="1200" dirty="0" err="1">
                 <a:solidFill>
                   <a:schemeClr val="tx1"/>
                 </a:solidFill>
@@ -1216,7 +1252,7 @@
               <a:t>AuthServer</a:t>
             </a:r>
             <a:r>
-              <a:rPr lang="de-DE" sz="1200" kern="1200" dirty="0">
+              <a:rPr lang="de-DE" sz="1050" kern="1200" dirty="0">
                 <a:solidFill>
                   <a:schemeClr val="tx1"/>
                 </a:solidFill>
@@ -1231,7 +1267,7 @@
           <a:p>
             <a:pPr lvl="0"/>
             <a:r>
-              <a:rPr lang="de-DE" sz="1200" kern="1200" dirty="0">
+              <a:rPr lang="de-DE" sz="1050" kern="1200" dirty="0">
                 <a:solidFill>
                   <a:schemeClr val="tx1"/>
                 </a:solidFill>
@@ -1244,7 +1280,7 @@
             </a:r>
           </a:p>
           <a:p>
-            <a:endParaRPr lang="de-DE" dirty="0"/>
+            <a:endParaRPr lang="de-DE" sz="1050" dirty="0"/>
           </a:p>
         </p:txBody>
       </p:sp>
@@ -1730,7 +1766,7 @@
           <a:p>
             <a:fld id="{A948E3CB-05B0-9B4E-8150-5620B1D4372B}" type="datetimeFigureOut">
               <a:rPr lang="de-DE" smtClean="0"/>
-              <a:t>14.05.2017</a:t>
+              <a:t>16.05.17</a:t>
             </a:fld>
             <a:endParaRPr lang="de-DE"/>
           </a:p>
@@ -1898,7 +1934,7 @@
           <a:p>
             <a:fld id="{A948E3CB-05B0-9B4E-8150-5620B1D4372B}" type="datetimeFigureOut">
               <a:rPr lang="de-DE" smtClean="0"/>
-              <a:t>14.05.2017</a:t>
+              <a:t>16.05.17</a:t>
             </a:fld>
             <a:endParaRPr lang="de-DE"/>
           </a:p>
@@ -2076,7 +2112,7 @@
           <a:p>
             <a:fld id="{A948E3CB-05B0-9B4E-8150-5620B1D4372B}" type="datetimeFigureOut">
               <a:rPr lang="de-DE" smtClean="0"/>
-              <a:t>14.05.2017</a:t>
+              <a:t>16.05.17</a:t>
             </a:fld>
             <a:endParaRPr lang="de-DE"/>
           </a:p>
@@ -2244,7 +2280,7 @@
           <a:p>
             <a:fld id="{A948E3CB-05B0-9B4E-8150-5620B1D4372B}" type="datetimeFigureOut">
               <a:rPr lang="de-DE" smtClean="0"/>
-              <a:t>14.05.2017</a:t>
+              <a:t>16.05.17</a:t>
             </a:fld>
             <a:endParaRPr lang="de-DE" dirty="0"/>
           </a:p>
@@ -2514,7 +2550,7 @@
           <a:p>
             <a:fld id="{A948E3CB-05B0-9B4E-8150-5620B1D4372B}" type="datetimeFigureOut">
               <a:rPr lang="de-DE" smtClean="0"/>
-              <a:t>14.05.2017</a:t>
+              <a:t>16.05.17</a:t>
             </a:fld>
             <a:endParaRPr lang="de-DE"/>
           </a:p>
@@ -2743,7 +2779,7 @@
           <a:p>
             <a:fld id="{A948E3CB-05B0-9B4E-8150-5620B1D4372B}" type="datetimeFigureOut">
               <a:rPr lang="de-DE" smtClean="0"/>
-              <a:t>14.05.2017</a:t>
+              <a:t>16.05.17</a:t>
             </a:fld>
             <a:endParaRPr lang="de-DE"/>
           </a:p>
@@ -3107,7 +3143,7 @@
           <a:p>
             <a:fld id="{A948E3CB-05B0-9B4E-8150-5620B1D4372B}" type="datetimeFigureOut">
               <a:rPr lang="de-DE" smtClean="0"/>
-              <a:t>14.05.2017</a:t>
+              <a:t>16.05.17</a:t>
             </a:fld>
             <a:endParaRPr lang="de-DE"/>
           </a:p>
@@ -3224,7 +3260,7 @@
           <a:p>
             <a:fld id="{A948E3CB-05B0-9B4E-8150-5620B1D4372B}" type="datetimeFigureOut">
               <a:rPr lang="de-DE" smtClean="0"/>
-              <a:t>14.05.2017</a:t>
+              <a:t>16.05.17</a:t>
             </a:fld>
             <a:endParaRPr lang="de-DE"/>
           </a:p>
@@ -3319,7 +3355,7 @@
           <a:p>
             <a:fld id="{A948E3CB-05B0-9B4E-8150-5620B1D4372B}" type="datetimeFigureOut">
               <a:rPr lang="de-DE" smtClean="0"/>
-              <a:t>14.05.2017</a:t>
+              <a:t>16.05.17</a:t>
             </a:fld>
             <a:endParaRPr lang="de-DE"/>
           </a:p>
@@ -3594,7 +3630,7 @@
           <a:p>
             <a:fld id="{A948E3CB-05B0-9B4E-8150-5620B1D4372B}" type="datetimeFigureOut">
               <a:rPr lang="de-DE" smtClean="0"/>
-              <a:t>14.05.2017</a:t>
+              <a:t>16.05.17</a:t>
             </a:fld>
             <a:endParaRPr lang="de-DE"/>
           </a:p>
@@ -3846,7 +3882,7 @@
           <a:p>
             <a:fld id="{A948E3CB-05B0-9B4E-8150-5620B1D4372B}" type="datetimeFigureOut">
               <a:rPr lang="de-DE" smtClean="0"/>
-              <a:t>14.05.2017</a:t>
+              <a:t>16.05.17</a:t>
             </a:fld>
             <a:endParaRPr lang="de-DE"/>
           </a:p>
@@ -4057,7 +4093,7 @@
           <a:p>
             <a:fld id="{A948E3CB-05B0-9B4E-8150-5620B1D4372B}" type="datetimeFigureOut">
               <a:rPr lang="de-DE" smtClean="0"/>
-              <a:t>14.05.2017</a:t>
+              <a:t>16.05.17</a:t>
             </a:fld>
             <a:endParaRPr lang="de-DE"/>
           </a:p>
@@ -4542,6 +4578,13 @@
   <p:clrMapOvr>
     <a:masterClrMapping/>
   </p:clrMapOvr>
+  <p:timing>
+    <p:tnLst>
+      <p:par>
+        <p:cTn id="1" dur="indefinite" restart="never" nodeType="tmRoot"/>
+      </p:par>
+    </p:tnLst>
+  </p:timing>
 </p:sld>
 </file>
 
@@ -4631,6 +4674,13 @@
   <p:clrMapOvr>
     <a:masterClrMapping/>
   </p:clrMapOvr>
+  <p:timing>
+    <p:tnLst>
+      <p:par>
+        <p:cTn id="1" dur="indefinite" restart="never" nodeType="tmRoot"/>
+      </p:par>
+    </p:tnLst>
+  </p:timing>
 </p:sld>
 </file>
 
@@ -4675,7 +4725,7 @@
       </p:sp>
       <p:pic>
         <p:nvPicPr>
-          <p:cNvPr id="5" name="Inhaltsplatzhalter 4"/>
+          <p:cNvPr id="8" name="Inhaltsplatzhalter 7"/>
           <p:cNvPicPr>
             <a:picLocks noGrp="1" noChangeAspect="1"/>
           </p:cNvPicPr>
@@ -4697,8 +4747,8 @@
         </p:blipFill>
         <p:spPr>
           <a:xfrm>
-            <a:off x="944905" y="1690688"/>
-            <a:ext cx="10302189" cy="4559324"/>
+            <a:off x="742660" y="1690688"/>
+            <a:ext cx="10728665" cy="4133056"/>
           </a:xfrm>
         </p:spPr>
       </p:pic>
@@ -4712,6 +4762,13 @@
   <p:clrMapOvr>
     <a:masterClrMapping/>
   </p:clrMapOvr>
+  <p:timing>
+    <p:tnLst>
+      <p:par>
+        <p:cTn id="1" dur="indefinite" restart="never" nodeType="tmRoot"/>
+      </p:par>
+    </p:tnLst>
+  </p:timing>
 </p:sld>
 </file>
 
@@ -4760,7 +4817,7 @@
       </p:sp>
       <p:pic>
         <p:nvPicPr>
-          <p:cNvPr id="5" name="Inhaltsplatzhalter 4"/>
+          <p:cNvPr id="4" name="Inhaltsplatzhalter 3"/>
           <p:cNvPicPr>
             <a:picLocks noGrp="1" noChangeAspect="1"/>
           </p:cNvPicPr>
@@ -4782,8 +4839,8 @@
         </p:blipFill>
         <p:spPr>
           <a:xfrm>
-            <a:off x="1538284" y="3073422"/>
-            <a:ext cx="9115431" cy="1288513"/>
+            <a:off x="474226" y="2798064"/>
+            <a:ext cx="11243547" cy="1765078"/>
           </a:xfrm>
         </p:spPr>
       </p:pic>
@@ -4797,6 +4854,13 @@
   <p:clrMapOvr>
     <a:masterClrMapping/>
   </p:clrMapOvr>
+  <p:timing>
+    <p:tnLst>
+      <p:par>
+        <p:cTn id="1" dur="indefinite" restart="never" nodeType="tmRoot"/>
+      </p:par>
+    </p:tnLst>
+  </p:timing>
 </p:sld>
 </file>
 
@@ -4924,6 +4988,13 @@
   <p:clrMapOvr>
     <a:masterClrMapping/>
   </p:clrMapOvr>
+  <p:timing>
+    <p:tnLst>
+      <p:par>
+        <p:cTn id="1" dur="indefinite" restart="never" nodeType="tmRoot"/>
+      </p:par>
+    </p:tnLst>
+  </p:timing>
 </p:sld>
 </file>
 

</xml_diff>